<commit_message>
Results from the estimation of three animals seizures have been included in the file estimationfigures.pptx
</commit_message>
<xml_diff>
--- a/fig/EstimationFigures.pptx
+++ b/fig/EstimationFigures.pptx
@@ -5,7 +5,8 @@
     <p:sldMasterId id="2147483648" r:id="rId1"/>
   </p:sldMasterIdLst>
   <p:sldIdLst>
-    <p:sldId id="256" r:id="rId2"/>
+    <p:sldId id="257" r:id="rId2"/>
+    <p:sldId id="258" r:id="rId3"/>
   </p:sldIdLst>
   <p:sldSz cx="9144000" cy="6858000" type="screen4x3"/>
   <p:notesSz cx="6858000" cy="9144000"/>
@@ -288,7 +289,7 @@
           <a:p>
             <a:fld id="{23031417-08DC-4991-BA64-45FCA174C9D0}" type="datetimeFigureOut">
               <a:rPr lang="en-AU" smtClean="0"/>
-              <a:t>19/09/2013</a:t>
+              <a:t>20/09/2013</a:t>
             </a:fld>
             <a:endParaRPr lang="en-AU"/>
           </a:p>
@@ -458,7 +459,7 @@
           <a:p>
             <a:fld id="{23031417-08DC-4991-BA64-45FCA174C9D0}" type="datetimeFigureOut">
               <a:rPr lang="en-AU" smtClean="0"/>
-              <a:t>19/09/2013</a:t>
+              <a:t>20/09/2013</a:t>
             </a:fld>
             <a:endParaRPr lang="en-AU"/>
           </a:p>
@@ -638,7 +639,7 @@
           <a:p>
             <a:fld id="{23031417-08DC-4991-BA64-45FCA174C9D0}" type="datetimeFigureOut">
               <a:rPr lang="en-AU" smtClean="0"/>
-              <a:t>19/09/2013</a:t>
+              <a:t>20/09/2013</a:t>
             </a:fld>
             <a:endParaRPr lang="en-AU"/>
           </a:p>
@@ -808,7 +809,7 @@
           <a:p>
             <a:fld id="{23031417-08DC-4991-BA64-45FCA174C9D0}" type="datetimeFigureOut">
               <a:rPr lang="en-AU" smtClean="0"/>
-              <a:t>19/09/2013</a:t>
+              <a:t>20/09/2013</a:t>
             </a:fld>
             <a:endParaRPr lang="en-AU"/>
           </a:p>
@@ -1054,7 +1055,7 @@
           <a:p>
             <a:fld id="{23031417-08DC-4991-BA64-45FCA174C9D0}" type="datetimeFigureOut">
               <a:rPr lang="en-AU" smtClean="0"/>
-              <a:t>19/09/2013</a:t>
+              <a:t>20/09/2013</a:t>
             </a:fld>
             <a:endParaRPr lang="en-AU"/>
           </a:p>
@@ -1342,7 +1343,7 @@
           <a:p>
             <a:fld id="{23031417-08DC-4991-BA64-45FCA174C9D0}" type="datetimeFigureOut">
               <a:rPr lang="en-AU" smtClean="0"/>
-              <a:t>19/09/2013</a:t>
+              <a:t>20/09/2013</a:t>
             </a:fld>
             <a:endParaRPr lang="en-AU"/>
           </a:p>
@@ -1764,7 +1765,7 @@
           <a:p>
             <a:fld id="{23031417-08DC-4991-BA64-45FCA174C9D0}" type="datetimeFigureOut">
               <a:rPr lang="en-AU" smtClean="0"/>
-              <a:t>19/09/2013</a:t>
+              <a:t>20/09/2013</a:t>
             </a:fld>
             <a:endParaRPr lang="en-AU"/>
           </a:p>
@@ -1882,7 +1883,7 @@
           <a:p>
             <a:fld id="{23031417-08DC-4991-BA64-45FCA174C9D0}" type="datetimeFigureOut">
               <a:rPr lang="en-AU" smtClean="0"/>
-              <a:t>19/09/2013</a:t>
+              <a:t>20/09/2013</a:t>
             </a:fld>
             <a:endParaRPr lang="en-AU"/>
           </a:p>
@@ -1977,7 +1978,7 @@
           <a:p>
             <a:fld id="{23031417-08DC-4991-BA64-45FCA174C9D0}" type="datetimeFigureOut">
               <a:rPr lang="en-AU" smtClean="0"/>
-              <a:t>19/09/2013</a:t>
+              <a:t>20/09/2013</a:t>
             </a:fld>
             <a:endParaRPr lang="en-AU"/>
           </a:p>
@@ -2254,7 +2255,7 @@
           <a:p>
             <a:fld id="{23031417-08DC-4991-BA64-45FCA174C9D0}" type="datetimeFigureOut">
               <a:rPr lang="en-AU" smtClean="0"/>
-              <a:t>19/09/2013</a:t>
+              <a:t>20/09/2013</a:t>
             </a:fld>
             <a:endParaRPr lang="en-AU"/>
           </a:p>
@@ -2507,7 +2508,7 @@
           <a:p>
             <a:fld id="{23031417-08DC-4991-BA64-45FCA174C9D0}" type="datetimeFigureOut">
               <a:rPr lang="en-AU" smtClean="0"/>
-              <a:t>19/09/2013</a:t>
+              <a:t>20/09/2013</a:t>
             </a:fld>
             <a:endParaRPr lang="en-AU"/>
           </a:p>
@@ -2720,7 +2721,7 @@
           <a:p>
             <a:fld id="{23031417-08DC-4991-BA64-45FCA174C9D0}" type="datetimeFigureOut">
               <a:rPr lang="en-AU" smtClean="0"/>
-              <a:t>19/09/2013</a:t>
+              <a:t>20/09/2013</a:t>
             </a:fld>
             <a:endParaRPr lang="en-AU"/>
           </a:p>
@@ -3095,15 +3096,469 @@
           <a:chExt cx="0" cy="0"/>
         </a:xfrm>
       </p:grpSpPr>
-      <p:sp>
-        <p:nvSpPr>
-          <p:cNvPr id="4" name="TextBox 3"/>
+      <p:grpSp>
+        <p:nvGrpSpPr>
+          <p:cNvPr id="2" name="Group 1"/>
+          <p:cNvGrpSpPr/>
+          <p:nvPr/>
+        </p:nvGrpSpPr>
+        <p:grpSpPr>
+          <a:xfrm>
+            <a:off x="-36512" y="404664"/>
+            <a:ext cx="2880000" cy="5403660"/>
+            <a:chOff x="0" y="0"/>
+            <a:chExt cx="2880000" cy="5403660"/>
+          </a:xfrm>
+        </p:grpSpPr>
+        <p:grpSp>
+          <p:nvGrpSpPr>
+            <p:cNvPr id="6" name="Group 5"/>
+            <p:cNvGrpSpPr/>
+            <p:nvPr/>
+          </p:nvGrpSpPr>
+          <p:grpSpPr>
+            <a:xfrm>
+              <a:off x="0" y="0"/>
+              <a:ext cx="2880000" cy="5403660"/>
+              <a:chOff x="0" y="0"/>
+              <a:chExt cx="2880000" cy="5403660"/>
+            </a:xfrm>
+          </p:grpSpPr>
+          <p:pic>
+            <p:nvPicPr>
+              <p:cNvPr id="1026" name="Picture 2"/>
+              <p:cNvPicPr>
+                <a:picLocks noChangeAspect="1" noChangeArrowheads="1"/>
+              </p:cNvPicPr>
+              <p:nvPr/>
+            </p:nvPicPr>
+            <p:blipFill>
+              <a:blip r:embed="rId2" cstate="print">
+                <a:extLst>
+                  <a:ext uri="{28A0092B-C50C-407E-A947-70E740481C1C}">
+                    <a14:useLocalDpi xmlns:a14="http://schemas.microsoft.com/office/drawing/2010/main" val="0"/>
+                  </a:ext>
+                </a:extLst>
+              </a:blip>
+              <a:srcRect/>
+              <a:stretch>
+                <a:fillRect/>
+              </a:stretch>
+            </p:blipFill>
+            <p:spPr bwMode="auto">
+              <a:xfrm>
+                <a:off x="0" y="0"/>
+                <a:ext cx="2880000" cy="3834000"/>
+              </a:xfrm>
+              <a:prstGeom prst="rect">
+                <a:avLst/>
+              </a:prstGeom>
+              <a:noFill/>
+              <a:ln>
+                <a:noFill/>
+              </a:ln>
+              <a:extLst>
+                <a:ext uri="{909E8E84-426E-40DD-AFC4-6F175D3DCCD1}">
+                  <a14:hiddenFill xmlns:a14="http://schemas.microsoft.com/office/drawing/2010/main">
+                    <a:solidFill>
+                      <a:schemeClr val="accent1"/>
+                    </a:solidFill>
+                  </a14:hiddenFill>
+                </a:ext>
+                <a:ext uri="{91240B29-F687-4F45-9708-019B960494DF}">
+                  <a14:hiddenLine xmlns:a14="http://schemas.microsoft.com/office/drawing/2010/main" w="9525">
+                    <a:solidFill>
+                      <a:schemeClr val="tx1"/>
+                    </a:solidFill>
+                    <a:miter lim="800000"/>
+                    <a:headEnd/>
+                    <a:tailEnd/>
+                  </a14:hiddenLine>
+                </a:ext>
+              </a:extLst>
+            </p:spPr>
+          </p:pic>
+          <p:sp>
+            <p:nvSpPr>
+              <p:cNvPr id="4" name="TextBox 3"/>
+              <p:cNvSpPr txBox="1"/>
+              <p:nvPr/>
+            </p:nvSpPr>
+            <p:spPr>
+              <a:xfrm>
+                <a:off x="107504" y="3834000"/>
+                <a:ext cx="2664296" cy="1569660"/>
+              </a:xfrm>
+              <a:prstGeom prst="rect">
+                <a:avLst/>
+              </a:prstGeom>
+              <a:noFill/>
+            </p:spPr>
+            <p:txBody>
+              <a:bodyPr wrap="square" rtlCol="0">
+                <a:spAutoFit/>
+              </a:bodyPr>
+              <a:lstStyle/>
+              <a:p>
+                <a:r>
+                  <a:rPr lang="en-AU" sz="800" dirty="0" smtClean="0">
+                    <a:latin typeface="Arial" panose="020B0604020202020204" pitchFamily="34" charset="0"/>
+                    <a:cs typeface="Arial" panose="020B0604020202020204" pitchFamily="34" charset="0"/>
+                  </a:rPr>
+                  <a:t>Figure 1. Results from the estimation of four seizures from the same animal. In Figure A the first seizure estimated is demonstrated. For this seizure, and all other seizures estimated the transition to </a:t>
+                </a:r>
+                <a:r>
+                  <a:rPr lang="en-AU" sz="800" dirty="0" err="1" smtClean="0">
+                    <a:latin typeface="Arial" panose="020B0604020202020204" pitchFamily="34" charset="0"/>
+                    <a:cs typeface="Arial" panose="020B0604020202020204" pitchFamily="34" charset="0"/>
+                  </a:rPr>
+                  <a:t>ictal</a:t>
+                </a:r>
+                <a:r>
+                  <a:rPr lang="en-AU" sz="800" dirty="0" smtClean="0">
+                    <a:latin typeface="Arial" panose="020B0604020202020204" pitchFamily="34" charset="0"/>
+                    <a:cs typeface="Arial" panose="020B0604020202020204" pitchFamily="34" charset="0"/>
+                  </a:rPr>
+                  <a:t> occurs at 0s, and end at the dotted line with the same colour as the estimated data. In Figure B,C and D the estimated synaptic gains for excitatory, slow inhibitory and fast inhibitory populations are demonstrated, with each colour corresponding to the results from a different seizure. Lastly, in Figure E the estimated input mean to the model cortical region is demonstrated.</a:t>
+                </a:r>
+                <a:endParaRPr lang="en-AU" sz="800" dirty="0">
+                  <a:latin typeface="Arial" panose="020B0604020202020204" pitchFamily="34" charset="0"/>
+                  <a:cs typeface="Arial" panose="020B0604020202020204" pitchFamily="34" charset="0"/>
+                </a:endParaRPr>
+              </a:p>
+            </p:txBody>
+          </p:sp>
+        </p:grpSp>
+        <p:sp>
+          <p:nvSpPr>
+            <p:cNvPr id="5" name="TextBox 4"/>
+            <p:cNvSpPr txBox="1"/>
+            <p:nvPr/>
+          </p:nvSpPr>
+          <p:spPr>
+            <a:xfrm>
+              <a:off x="35496" y="188640"/>
+              <a:ext cx="295274" cy="276999"/>
+            </a:xfrm>
+            <a:prstGeom prst="rect">
+              <a:avLst/>
+            </a:prstGeom>
+            <a:noFill/>
+          </p:spPr>
+          <p:txBody>
+            <a:bodyPr wrap="none" rtlCol="0">
+              <a:spAutoFit/>
+            </a:bodyPr>
+            <a:lstStyle/>
+            <a:p>
+              <a:r>
+                <a:rPr lang="en-AU" sz="1200" b="1" dirty="0" smtClean="0">
+                  <a:latin typeface="Arial" panose="020B0604020202020204" pitchFamily="34" charset="0"/>
+                  <a:cs typeface="Arial" panose="020B0604020202020204" pitchFamily="34" charset="0"/>
+                </a:rPr>
+                <a:t>A</a:t>
+              </a:r>
+              <a:endParaRPr lang="en-AU" sz="1200" b="1" dirty="0">
+                <a:latin typeface="Arial" panose="020B0604020202020204" pitchFamily="34" charset="0"/>
+                <a:cs typeface="Arial" panose="020B0604020202020204" pitchFamily="34" charset="0"/>
+              </a:endParaRPr>
+            </a:p>
+          </p:txBody>
+        </p:sp>
+        <p:sp>
+          <p:nvSpPr>
+            <p:cNvPr id="7" name="TextBox 6"/>
+            <p:cNvSpPr txBox="1"/>
+            <p:nvPr/>
+          </p:nvSpPr>
+          <p:spPr>
+            <a:xfrm>
+              <a:off x="54795" y="703819"/>
+              <a:ext cx="295274" cy="276999"/>
+            </a:xfrm>
+            <a:prstGeom prst="rect">
+              <a:avLst/>
+            </a:prstGeom>
+            <a:noFill/>
+          </p:spPr>
+          <p:txBody>
+            <a:bodyPr wrap="none" rtlCol="0">
+              <a:spAutoFit/>
+            </a:bodyPr>
+            <a:lstStyle/>
+            <a:p>
+              <a:r>
+                <a:rPr lang="en-AU" sz="1200" b="1" dirty="0">
+                  <a:latin typeface="Arial" panose="020B0604020202020204" pitchFamily="34" charset="0"/>
+                  <a:cs typeface="Arial" panose="020B0604020202020204" pitchFamily="34" charset="0"/>
+                </a:rPr>
+                <a:t>B</a:t>
+              </a:r>
+            </a:p>
+          </p:txBody>
+        </p:sp>
+        <p:sp>
+          <p:nvSpPr>
+            <p:cNvPr id="8" name="TextBox 7"/>
+            <p:cNvSpPr txBox="1"/>
+            <p:nvPr/>
+          </p:nvSpPr>
+          <p:spPr>
+            <a:xfrm>
+              <a:off x="35496" y="1412776"/>
+              <a:ext cx="295274" cy="276999"/>
+            </a:xfrm>
+            <a:prstGeom prst="rect">
+              <a:avLst/>
+            </a:prstGeom>
+            <a:noFill/>
+          </p:spPr>
+          <p:txBody>
+            <a:bodyPr wrap="none" rtlCol="0">
+              <a:spAutoFit/>
+            </a:bodyPr>
+            <a:lstStyle/>
+            <a:p>
+              <a:r>
+                <a:rPr lang="en-AU" sz="1200" b="1" dirty="0">
+                  <a:latin typeface="Arial" panose="020B0604020202020204" pitchFamily="34" charset="0"/>
+                  <a:cs typeface="Arial" panose="020B0604020202020204" pitchFamily="34" charset="0"/>
+                </a:rPr>
+                <a:t>C</a:t>
+              </a:r>
+            </a:p>
+          </p:txBody>
+        </p:sp>
+        <p:sp>
+          <p:nvSpPr>
+            <p:cNvPr id="9" name="TextBox 8"/>
+            <p:cNvSpPr txBox="1"/>
+            <p:nvPr/>
+          </p:nvSpPr>
+          <p:spPr>
+            <a:xfrm>
+              <a:off x="35496" y="2060848"/>
+              <a:ext cx="295274" cy="276999"/>
+            </a:xfrm>
+            <a:prstGeom prst="rect">
+              <a:avLst/>
+            </a:prstGeom>
+            <a:noFill/>
+          </p:spPr>
+          <p:txBody>
+            <a:bodyPr wrap="none" rtlCol="0">
+              <a:spAutoFit/>
+            </a:bodyPr>
+            <a:lstStyle/>
+            <a:p>
+              <a:r>
+                <a:rPr lang="en-AU" sz="1200" b="1" dirty="0">
+                  <a:latin typeface="Arial" panose="020B0604020202020204" pitchFamily="34" charset="0"/>
+                  <a:cs typeface="Arial" panose="020B0604020202020204" pitchFamily="34" charset="0"/>
+                </a:rPr>
+                <a:t>D</a:t>
+              </a:r>
+            </a:p>
+          </p:txBody>
+        </p:sp>
+        <p:sp>
+          <p:nvSpPr>
+            <p:cNvPr id="10" name="TextBox 9"/>
+            <p:cNvSpPr txBox="1"/>
+            <p:nvPr/>
+          </p:nvSpPr>
+          <p:spPr>
+            <a:xfrm>
+              <a:off x="35496" y="2708920"/>
+              <a:ext cx="287258" cy="276999"/>
+            </a:xfrm>
+            <a:prstGeom prst="rect">
+              <a:avLst/>
+            </a:prstGeom>
+            <a:noFill/>
+          </p:spPr>
+          <p:txBody>
+            <a:bodyPr wrap="none" rtlCol="0">
+              <a:spAutoFit/>
+            </a:bodyPr>
+            <a:lstStyle/>
+            <a:p>
+              <a:r>
+                <a:rPr lang="en-AU" sz="1200" b="1" dirty="0">
+                  <a:latin typeface="Arial" panose="020B0604020202020204" pitchFamily="34" charset="0"/>
+                  <a:cs typeface="Arial" panose="020B0604020202020204" pitchFamily="34" charset="0"/>
+                </a:rPr>
+                <a:t>E</a:t>
+              </a:r>
+            </a:p>
+          </p:txBody>
+        </p:sp>
+      </p:grpSp>
+    </p:spTree>
+    <p:extLst>
+      <p:ext uri="{BB962C8B-B14F-4D97-AF65-F5344CB8AC3E}">
+        <p14:creationId xmlns:p14="http://schemas.microsoft.com/office/powerpoint/2010/main" val="3990381557"/>
+      </p:ext>
+    </p:extLst>
+  </p:cSld>
+  <p:clrMapOvr>
+    <a:masterClrMapping/>
+  </p:clrMapOvr>
+</p:sld>
+</file>
+
+<file path=ppt/slides/slide2.xml><?xml version="1.0" encoding="utf-8"?>
+<p:sld xmlns:a="http://schemas.openxmlformats.org/drawingml/2006/main" xmlns:r="http://schemas.openxmlformats.org/officeDocument/2006/relationships" xmlns:p="http://schemas.openxmlformats.org/presentationml/2006/main">
+  <p:cSld>
+    <p:spTree>
+      <p:nvGrpSpPr>
+        <p:cNvPr id="1" name=""/>
+        <p:cNvGrpSpPr/>
+        <p:nvPr/>
+      </p:nvGrpSpPr>
+      <p:grpSpPr>
+        <a:xfrm>
+          <a:off x="0" y="0"/>
+          <a:ext cx="0" cy="0"/>
+          <a:chOff x="0" y="0"/>
+          <a:chExt cx="0" cy="0"/>
+        </a:xfrm>
+      </p:grpSpPr>
+      <p:sp>
+        <p:nvSpPr>
+          <p:cNvPr id="4" name="Rectangle 3"/>
+          <p:cNvSpPr/>
+          <p:nvPr/>
+        </p:nvSpPr>
+        <p:spPr>
+          <a:xfrm>
+            <a:off x="0" y="0"/>
+            <a:ext cx="6120000" cy="8280000"/>
+          </a:xfrm>
+          <a:prstGeom prst="rect">
+            <a:avLst/>
+          </a:prstGeom>
+          <a:noFill/>
+          <a:ln w="6350"/>
+        </p:spPr>
+        <p:style>
+          <a:lnRef idx="2">
+            <a:schemeClr val="accent1">
+              <a:shade val="50000"/>
+            </a:schemeClr>
+          </a:lnRef>
+          <a:fillRef idx="1">
+            <a:schemeClr val="accent1"/>
+          </a:fillRef>
+          <a:effectRef idx="0">
+            <a:schemeClr val="accent1"/>
+          </a:effectRef>
+          <a:fontRef idx="minor">
+            <a:schemeClr val="lt1"/>
+          </a:fontRef>
+        </p:style>
+        <p:txBody>
+          <a:bodyPr rtlCol="0" anchor="ctr"/>
+          <a:lstStyle/>
+          <a:p>
+            <a:pPr algn="ctr"/>
+            <a:endParaRPr lang="en-AU"/>
+          </a:p>
+        </p:txBody>
+      </p:sp>
+      <p:sp>
+        <p:nvSpPr>
+          <p:cNvPr id="5" name="Rectangle 4"/>
+          <p:cNvSpPr/>
+          <p:nvPr/>
+        </p:nvSpPr>
+        <p:spPr>
+          <a:xfrm>
+            <a:off x="0" y="0"/>
+            <a:ext cx="3060000" cy="8280000"/>
+          </a:xfrm>
+          <a:prstGeom prst="rect">
+            <a:avLst/>
+          </a:prstGeom>
+          <a:noFill/>
+          <a:ln w="6350"/>
+        </p:spPr>
+        <p:style>
+          <a:lnRef idx="2">
+            <a:schemeClr val="accent1">
+              <a:shade val="50000"/>
+            </a:schemeClr>
+          </a:lnRef>
+          <a:fillRef idx="1">
+            <a:schemeClr val="accent1"/>
+          </a:fillRef>
+          <a:effectRef idx="0">
+            <a:schemeClr val="accent1"/>
+          </a:effectRef>
+          <a:fontRef idx="minor">
+            <a:schemeClr val="lt1"/>
+          </a:fontRef>
+        </p:style>
+        <p:txBody>
+          <a:bodyPr rtlCol="0" anchor="ctr"/>
+          <a:lstStyle/>
+          <a:p>
+            <a:pPr algn="ctr"/>
+            <a:endParaRPr lang="en-AU"/>
+          </a:p>
+        </p:txBody>
+      </p:sp>
+      <p:sp>
+        <p:nvSpPr>
+          <p:cNvPr id="6" name="Rectangle 5"/>
+          <p:cNvSpPr/>
+          <p:nvPr/>
+        </p:nvSpPr>
+        <p:spPr>
+          <a:xfrm>
+            <a:off x="0" y="0"/>
+            <a:ext cx="6120000" cy="4140000"/>
+          </a:xfrm>
+          <a:prstGeom prst="rect">
+            <a:avLst/>
+          </a:prstGeom>
+          <a:noFill/>
+          <a:ln w="3175"/>
+        </p:spPr>
+        <p:style>
+          <a:lnRef idx="2">
+            <a:schemeClr val="accent1">
+              <a:shade val="50000"/>
+            </a:schemeClr>
+          </a:lnRef>
+          <a:fillRef idx="1">
+            <a:schemeClr val="accent1"/>
+          </a:fillRef>
+          <a:effectRef idx="0">
+            <a:schemeClr val="accent1"/>
+          </a:effectRef>
+          <a:fontRef idx="minor">
+            <a:schemeClr val="lt1"/>
+          </a:fontRef>
+        </p:style>
+        <p:txBody>
+          <a:bodyPr rtlCol="0" anchor="ctr"/>
+          <a:lstStyle/>
+          <a:p>
+            <a:pPr algn="ctr"/>
+            <a:endParaRPr lang="en-AU"/>
+          </a:p>
+        </p:txBody>
+      </p:sp>
+      <p:sp>
+        <p:nvSpPr>
+          <p:cNvPr id="7" name="TextBox 6"/>
           <p:cNvSpPr txBox="1"/>
           <p:nvPr/>
         </p:nvSpPr>
         <p:spPr>
           <a:xfrm>
-            <a:off x="-298" y="35846"/>
+            <a:off x="0" y="0"/>
             <a:ext cx="295274" cy="276999"/>
           </a:xfrm>
           <a:prstGeom prst="rect">
@@ -3133,13 +3588,13 @@
       </p:sp>
       <p:sp>
         <p:nvSpPr>
-          <p:cNvPr id="5" name="TextBox 4"/>
+          <p:cNvPr id="8" name="TextBox 7"/>
           <p:cNvSpPr txBox="1"/>
           <p:nvPr/>
         </p:nvSpPr>
         <p:spPr>
           <a:xfrm>
-            <a:off x="719782" y="1388900"/>
+            <a:off x="3060000" y="-1"/>
             <a:ext cx="295274" cy="276999"/>
           </a:xfrm>
           <a:prstGeom prst="rect">
@@ -3158,20 +3613,24 @@
                 <a:latin typeface="Arial" panose="020B0604020202020204" pitchFamily="34" charset="0"/>
                 <a:cs typeface="Arial" panose="020B0604020202020204" pitchFamily="34" charset="0"/>
               </a:rPr>
-              <a:t>C</a:t>
-            </a:r>
-          </a:p>
-        </p:txBody>
-      </p:sp>
-      <p:sp>
-        <p:nvSpPr>
-          <p:cNvPr id="6" name="TextBox 5"/>
+              <a:t>B</a:t>
+            </a:r>
+            <a:endParaRPr lang="en-AU" sz="1200" b="1" dirty="0">
+              <a:latin typeface="Arial" panose="020B0604020202020204" pitchFamily="34" charset="0"/>
+              <a:cs typeface="Arial" panose="020B0604020202020204" pitchFamily="34" charset="0"/>
+            </a:endParaRPr>
+          </a:p>
+        </p:txBody>
+      </p:sp>
+      <p:sp>
+        <p:nvSpPr>
+          <p:cNvPr id="9" name="TextBox 8"/>
           <p:cNvSpPr txBox="1"/>
           <p:nvPr/>
         </p:nvSpPr>
         <p:spPr>
           <a:xfrm>
-            <a:off x="606375" y="35846"/>
+            <a:off x="0" y="4140000"/>
             <a:ext cx="295274" cy="276999"/>
           </a:xfrm>
           <a:prstGeom prst="rect">
@@ -3190,14 +3649,54 @@
                 <a:latin typeface="Arial" panose="020B0604020202020204" pitchFamily="34" charset="0"/>
                 <a:cs typeface="Arial" panose="020B0604020202020204" pitchFamily="34" charset="0"/>
               </a:rPr>
-              <a:t>B</a:t>
-            </a:r>
+              <a:t>C</a:t>
+            </a:r>
+            <a:endParaRPr lang="en-AU" sz="1200" b="1" dirty="0">
+              <a:latin typeface="Arial" panose="020B0604020202020204" pitchFamily="34" charset="0"/>
+              <a:cs typeface="Arial" panose="020B0604020202020204" pitchFamily="34" charset="0"/>
+            </a:endParaRPr>
+          </a:p>
+        </p:txBody>
+      </p:sp>
+      <p:sp>
+        <p:nvSpPr>
+          <p:cNvPr id="10" name="TextBox 9"/>
+          <p:cNvSpPr txBox="1"/>
+          <p:nvPr/>
+        </p:nvSpPr>
+        <p:spPr>
+          <a:xfrm>
+            <a:off x="3060000" y="4140000"/>
+            <a:ext cx="295274" cy="276999"/>
+          </a:xfrm>
+          <a:prstGeom prst="rect">
+            <a:avLst/>
+          </a:prstGeom>
+          <a:noFill/>
+        </p:spPr>
+        <p:txBody>
+          <a:bodyPr wrap="none" rtlCol="0">
+            <a:spAutoFit/>
+          </a:bodyPr>
+          <a:lstStyle/>
+          <a:p>
+            <a:r>
+              <a:rPr lang="en-AU" sz="1200" b="1" dirty="0">
+                <a:latin typeface="Arial" panose="020B0604020202020204" pitchFamily="34" charset="0"/>
+                <a:cs typeface="Arial" panose="020B0604020202020204" pitchFamily="34" charset="0"/>
+              </a:rPr>
+              <a:t>D</a:t>
+            </a:r>
+            <a:endParaRPr lang="en-AU" sz="1200" b="1" dirty="0">
+              <a:latin typeface="Arial" panose="020B0604020202020204" pitchFamily="34" charset="0"/>
+              <a:cs typeface="Arial" panose="020B0604020202020204" pitchFamily="34" charset="0"/>
+            </a:endParaRPr>
           </a:p>
         </p:txBody>
       </p:sp>
       <p:pic>
         <p:nvPicPr>
-          <p:cNvPr id="7" name="Picture 10"/>
+          <p:cNvPr id="1026" name="Picture 2"/>
           <p:cNvPicPr>
             <a:picLocks noChangeAspect="1" noChangeArrowheads="1"/>
           </p:cNvPicPr>
@@ -3211,13 +3710,13 @@
               </a:ext>
             </a:extLst>
           </a:blip>
-          <a:srcRect l="690" t="6649" r="3805" b="1789"/>
+          <a:srcRect l="1969" t="4362" r="1958" b="3787"/>
           <a:stretch/>
         </p:blipFill>
         <p:spPr bwMode="auto">
           <a:xfrm>
-            <a:off x="1101600" y="1810800"/>
-            <a:ext cx="1710000" cy="1054800"/>
+            <a:off x="3114168" y="279072"/>
+            <a:ext cx="2970000" cy="3798000"/>
           </a:xfrm>
           <a:prstGeom prst="rect">
             <a:avLst/>
@@ -3249,7 +3748,7 @@
       </p:pic>
       <p:pic>
         <p:nvPicPr>
-          <p:cNvPr id="8" name="Picture 11"/>
+          <p:cNvPr id="1028" name="Picture 4"/>
           <p:cNvPicPr>
             <a:picLocks noChangeAspect="1" noChangeArrowheads="1"/>
           </p:cNvPicPr>
@@ -3263,13 +3762,13 @@
               </a:ext>
             </a:extLst>
           </a:blip>
-          <a:srcRect l="927" t="5327" r="4769" b="2488"/>
+          <a:srcRect l="1639" t="3410" r="4642" b="4175"/>
           <a:stretch/>
         </p:blipFill>
         <p:spPr bwMode="auto">
           <a:xfrm>
-            <a:off x="1182664" y="236900"/>
-            <a:ext cx="1674000" cy="1062000"/>
+            <a:off x="107504" y="4401528"/>
+            <a:ext cx="2880000" cy="3780000"/>
           </a:xfrm>
           <a:prstGeom prst="rect">
             <a:avLst/>
@@ -3299,661 +3798,62 @@
           </a:extLst>
         </p:spPr>
       </p:pic>
-      <p:grpSp>
-        <p:nvGrpSpPr>
-          <p:cNvPr id="9" name="Group 8"/>
-          <p:cNvGrpSpPr/>
+      <p:pic>
+        <p:nvPicPr>
+          <p:cNvPr id="1029" name="Picture 5"/>
+          <p:cNvPicPr>
+            <a:picLocks noChangeAspect="1" noChangeArrowheads="1"/>
+          </p:cNvPicPr>
           <p:nvPr/>
-        </p:nvGrpSpPr>
-        <p:grpSpPr>
+        </p:nvPicPr>
+        <p:blipFill rotWithShape="1">
+          <a:blip r:embed="rId4" cstate="print">
+            <a:extLst>
+              <a:ext uri="{28A0092B-C50C-407E-A947-70E740481C1C}">
+                <a14:useLocalDpi xmlns:a14="http://schemas.microsoft.com/office/drawing/2010/main" val="0"/>
+              </a:ext>
+            </a:extLst>
+          </a:blip>
+          <a:srcRect l="2176" t="3785" r="2226" b="4100"/>
+          <a:stretch/>
+        </p:blipFill>
+        <p:spPr bwMode="auto">
           <a:xfrm>
-            <a:off x="234000" y="1847080"/>
-            <a:ext cx="252000" cy="252000"/>
-            <a:chOff x="296225" y="1283034"/>
-            <a:chExt cx="252000" cy="252000"/>
-          </a:xfrm>
-        </p:grpSpPr>
-        <p:sp>
-          <p:nvSpPr>
-            <p:cNvPr id="10" name="Isosceles Triangle 9"/>
-            <p:cNvSpPr/>
-            <p:nvPr/>
-          </p:nvSpPr>
-          <p:spPr>
-            <a:xfrm flipV="1">
-              <a:off x="296225" y="1283034"/>
-              <a:ext cx="252000" cy="252000"/>
-            </a:xfrm>
-            <a:prstGeom prst="triangle">
-              <a:avLst/>
-            </a:prstGeom>
-            <a:noFill/>
-            <a:ln w="12700">
-              <a:solidFill>
-                <a:schemeClr val="tx1"/>
-              </a:solidFill>
-            </a:ln>
-          </p:spPr>
-          <p:style>
-            <a:lnRef idx="2">
-              <a:schemeClr val="accent1">
-                <a:shade val="50000"/>
-              </a:schemeClr>
-            </a:lnRef>
-            <a:fillRef idx="1">
-              <a:schemeClr val="accent1"/>
-            </a:fillRef>
-            <a:effectRef idx="0">
-              <a:schemeClr val="accent1"/>
-            </a:effectRef>
-            <a:fontRef idx="minor">
-              <a:schemeClr val="lt1"/>
-            </a:fontRef>
-          </p:style>
-          <p:txBody>
-            <a:bodyPr rtlCol="0" anchor="ctr"/>
-            <a:lstStyle/>
-            <a:p>
-              <a:pPr algn="ctr"/>
-              <a:endParaRPr lang="en-AU"/>
-            </a:p>
-          </p:txBody>
-        </p:sp>
-        <p:cxnSp>
-          <p:nvCxnSpPr>
-            <p:cNvPr id="11" name="Curved Connector 10"/>
-            <p:cNvCxnSpPr/>
-            <p:nvPr/>
-          </p:nvCxnSpPr>
-          <p:spPr>
-            <a:xfrm flipV="1">
-              <a:off x="389400" y="1347834"/>
-              <a:ext cx="72000" cy="72000"/>
-            </a:xfrm>
-            <a:prstGeom prst="curvedConnector3">
-              <a:avLst/>
-            </a:prstGeom>
-            <a:ln w="12700">
-              <a:solidFill>
-                <a:schemeClr val="tx1"/>
-              </a:solidFill>
-            </a:ln>
-            <a:effectLst/>
-          </p:spPr>
-          <p:style>
-            <a:lnRef idx="2">
-              <a:schemeClr val="accent1"/>
-            </a:lnRef>
-            <a:fillRef idx="0">
-              <a:schemeClr val="accent1"/>
-            </a:fillRef>
-            <a:effectRef idx="1">
-              <a:schemeClr val="accent1"/>
-            </a:effectRef>
-            <a:fontRef idx="minor">
-              <a:schemeClr val="tx1"/>
-            </a:fontRef>
-          </p:style>
-        </p:cxnSp>
-      </p:grpSp>
-      <p:grpSp>
-        <p:nvGrpSpPr>
-          <p:cNvPr id="12" name="Group 11"/>
-          <p:cNvGrpSpPr/>
-          <p:nvPr/>
-        </p:nvGrpSpPr>
-        <p:grpSpPr>
-          <a:xfrm>
-            <a:off x="366957" y="770004"/>
-            <a:ext cx="108879" cy="178200"/>
-            <a:chOff x="372478" y="1414218"/>
-            <a:chExt cx="108879" cy="178200"/>
-          </a:xfrm>
-        </p:grpSpPr>
-        <p:cxnSp>
-          <p:nvCxnSpPr>
-            <p:cNvPr id="13" name="Straight Connector 12"/>
-            <p:cNvCxnSpPr/>
-            <p:nvPr/>
-          </p:nvCxnSpPr>
-          <p:spPr>
-            <a:xfrm flipV="1">
-              <a:off x="425860" y="1414218"/>
-              <a:ext cx="0" cy="36000"/>
-            </a:xfrm>
-            <a:prstGeom prst="line">
-              <a:avLst/>
-            </a:prstGeom>
-            <a:ln w="12700">
-              <a:solidFill>
-                <a:schemeClr val="tx1"/>
-              </a:solidFill>
-            </a:ln>
-          </p:spPr>
-          <p:style>
-            <a:lnRef idx="1">
-              <a:schemeClr val="accent1"/>
-            </a:lnRef>
-            <a:fillRef idx="0">
-              <a:schemeClr val="accent1"/>
-            </a:fillRef>
-            <a:effectRef idx="0">
-              <a:schemeClr val="accent1"/>
-            </a:effectRef>
-            <a:fontRef idx="minor">
-              <a:schemeClr val="tx1"/>
-            </a:fontRef>
-          </p:style>
-        </p:cxnSp>
-        <p:grpSp>
-          <p:nvGrpSpPr>
-            <p:cNvPr id="14" name="Group 13"/>
-            <p:cNvGrpSpPr/>
-            <p:nvPr/>
-          </p:nvGrpSpPr>
-          <p:grpSpPr>
-            <a:xfrm>
-              <a:off x="372478" y="1449199"/>
-              <a:ext cx="108879" cy="19018"/>
-              <a:chOff x="4724894" y="1611142"/>
-              <a:chExt cx="108879" cy="19018"/>
-            </a:xfrm>
-          </p:grpSpPr>
-          <p:cxnSp>
-            <p:nvCxnSpPr>
-              <p:cNvPr id="17" name="Straight Connector 16"/>
-              <p:cNvCxnSpPr/>
-              <p:nvPr/>
-            </p:nvCxnSpPr>
-            <p:spPr>
-              <a:xfrm>
-                <a:off x="4725773" y="1612161"/>
-                <a:ext cx="108000" cy="0"/>
-              </a:xfrm>
-              <a:prstGeom prst="line">
-                <a:avLst/>
-              </a:prstGeom>
-              <a:ln w="12700">
-                <a:solidFill>
-                  <a:schemeClr val="tx1"/>
-                </a:solidFill>
-              </a:ln>
-            </p:spPr>
-            <p:style>
-              <a:lnRef idx="1">
-                <a:schemeClr val="accent1"/>
-              </a:lnRef>
-              <a:fillRef idx="0">
-                <a:schemeClr val="accent1"/>
-              </a:fillRef>
-              <a:effectRef idx="0">
-                <a:schemeClr val="accent1"/>
-              </a:effectRef>
-              <a:fontRef idx="minor">
-                <a:schemeClr val="tx1"/>
-              </a:fontRef>
-            </p:style>
-          </p:cxnSp>
-          <p:cxnSp>
-            <p:nvCxnSpPr>
-              <p:cNvPr id="18" name="Straight Connector 17"/>
-              <p:cNvCxnSpPr/>
-              <p:nvPr/>
-            </p:nvCxnSpPr>
-            <p:spPr>
-              <a:xfrm>
-                <a:off x="4724894" y="1612160"/>
-                <a:ext cx="0" cy="18000"/>
-              </a:xfrm>
-              <a:prstGeom prst="line">
-                <a:avLst/>
-              </a:prstGeom>
-              <a:ln w="12700">
-                <a:solidFill>
-                  <a:schemeClr val="tx1"/>
-                </a:solidFill>
-              </a:ln>
-            </p:spPr>
-            <p:style>
-              <a:lnRef idx="1">
-                <a:schemeClr val="accent1"/>
-              </a:lnRef>
-              <a:fillRef idx="0">
-                <a:schemeClr val="accent1"/>
-              </a:fillRef>
-              <a:effectRef idx="0">
-                <a:schemeClr val="accent1"/>
-              </a:effectRef>
-              <a:fontRef idx="minor">
-                <a:schemeClr val="tx1"/>
-              </a:fontRef>
-            </p:style>
-          </p:cxnSp>
-          <p:cxnSp>
-            <p:nvCxnSpPr>
-              <p:cNvPr id="19" name="Straight Connector 18"/>
-              <p:cNvCxnSpPr/>
-              <p:nvPr/>
-            </p:nvCxnSpPr>
-            <p:spPr>
-              <a:xfrm>
-                <a:off x="4832400" y="1611142"/>
-                <a:ext cx="0" cy="18000"/>
-              </a:xfrm>
-              <a:prstGeom prst="line">
-                <a:avLst/>
-              </a:prstGeom>
-              <a:ln w="12700">
-                <a:solidFill>
-                  <a:schemeClr val="tx1"/>
-                </a:solidFill>
-              </a:ln>
-            </p:spPr>
-            <p:style>
-              <a:lnRef idx="1">
-                <a:schemeClr val="accent1"/>
-              </a:lnRef>
-              <a:fillRef idx="0">
-                <a:schemeClr val="accent1"/>
-              </a:fillRef>
-              <a:effectRef idx="0">
-                <a:schemeClr val="accent1"/>
-              </a:effectRef>
-              <a:fontRef idx="minor">
-                <a:schemeClr val="tx1"/>
-              </a:fontRef>
-            </p:style>
-          </p:cxnSp>
-        </p:grpSp>
-        <p:sp>
-          <p:nvSpPr>
-            <p:cNvPr id="15" name="Rectangle 14"/>
-            <p:cNvSpPr/>
-            <p:nvPr/>
-          </p:nvSpPr>
-          <p:spPr>
-            <a:xfrm>
-              <a:off x="383270" y="1470018"/>
-              <a:ext cx="86400" cy="86400"/>
-            </a:xfrm>
-            <a:prstGeom prst="rect">
-              <a:avLst/>
-            </a:prstGeom>
-            <a:solidFill>
-              <a:schemeClr val="tx1"/>
-            </a:solidFill>
-            <a:ln w="12700">
-              <a:noFill/>
-            </a:ln>
-          </p:spPr>
-          <p:style>
-            <a:lnRef idx="2">
-              <a:schemeClr val="accent1">
-                <a:shade val="50000"/>
-              </a:schemeClr>
-            </a:lnRef>
-            <a:fillRef idx="1">
-              <a:schemeClr val="accent1"/>
-            </a:fillRef>
-            <a:effectRef idx="0">
-              <a:schemeClr val="accent1"/>
-            </a:effectRef>
-            <a:fontRef idx="minor">
-              <a:schemeClr val="lt1"/>
-            </a:fontRef>
-          </p:style>
-          <p:txBody>
-            <a:bodyPr rtlCol="0" anchor="ctr"/>
-            <a:lstStyle/>
-            <a:p>
-              <a:pPr algn="ctr"/>
-              <a:endParaRPr lang="en-AU"/>
-            </a:p>
-          </p:txBody>
-        </p:sp>
-        <p:cxnSp>
-          <p:nvCxnSpPr>
-            <p:cNvPr id="16" name="Straight Connector 15"/>
-            <p:cNvCxnSpPr/>
-            <p:nvPr/>
-          </p:nvCxnSpPr>
-          <p:spPr>
-            <a:xfrm flipV="1">
-              <a:off x="426470" y="1556418"/>
-              <a:ext cx="0" cy="36000"/>
-            </a:xfrm>
-            <a:prstGeom prst="line">
-              <a:avLst/>
-            </a:prstGeom>
-            <a:ln w="12700">
-              <a:solidFill>
-                <a:schemeClr val="tx1"/>
-              </a:solidFill>
-            </a:ln>
-          </p:spPr>
-          <p:style>
-            <a:lnRef idx="1">
-              <a:schemeClr val="accent1"/>
-            </a:lnRef>
-            <a:fillRef idx="0">
-              <a:schemeClr val="accent1"/>
-            </a:fillRef>
-            <a:effectRef idx="0">
-              <a:schemeClr val="accent1"/>
-            </a:effectRef>
-            <a:fontRef idx="minor">
-              <a:schemeClr val="tx1"/>
-            </a:fontRef>
-          </p:style>
-        </p:cxnSp>
-      </p:grpSp>
-      <p:cxnSp>
-        <p:nvCxnSpPr>
-          <p:cNvPr id="20" name="Straight Connector 19"/>
-          <p:cNvCxnSpPr/>
-          <p:nvPr/>
-        </p:nvCxnSpPr>
-        <p:spPr>
-          <a:xfrm>
-            <a:off x="360000" y="2099080"/>
-            <a:ext cx="2417" cy="205200"/>
-          </a:xfrm>
-          <a:prstGeom prst="line">
-            <a:avLst/>
-          </a:prstGeom>
-          <a:ln w="12700">
-            <a:solidFill>
-              <a:schemeClr val="tx1"/>
-            </a:solidFill>
-          </a:ln>
-        </p:spPr>
-        <p:style>
-          <a:lnRef idx="1">
-            <a:schemeClr val="accent1"/>
-          </a:lnRef>
-          <a:fillRef idx="0">
-            <a:schemeClr val="accent1"/>
-          </a:fillRef>
-          <a:effectRef idx="0">
-            <a:schemeClr val="accent1"/>
-          </a:effectRef>
-          <a:fontRef idx="minor">
-            <a:schemeClr val="tx1"/>
-          </a:fontRef>
-        </p:style>
-      </p:cxnSp>
-      <p:cxnSp>
-        <p:nvCxnSpPr>
-          <p:cNvPr id="21" name="Straight Connector 20"/>
-          <p:cNvCxnSpPr/>
-          <p:nvPr/>
-        </p:nvCxnSpPr>
-        <p:spPr>
-          <a:xfrm flipH="1">
-            <a:off x="360000" y="945029"/>
-            <a:ext cx="0" cy="899980"/>
-          </a:xfrm>
-          <a:prstGeom prst="line">
-            <a:avLst/>
-          </a:prstGeom>
-          <a:ln w="12700">
-            <a:solidFill>
-              <a:schemeClr val="tx1"/>
-            </a:solidFill>
-          </a:ln>
-        </p:spPr>
-        <p:style>
-          <a:lnRef idx="1">
-            <a:schemeClr val="accent1"/>
-          </a:lnRef>
-          <a:fillRef idx="0">
-            <a:schemeClr val="accent1"/>
-          </a:fillRef>
-          <a:effectRef idx="0">
-            <a:schemeClr val="accent1"/>
-          </a:effectRef>
-          <a:fontRef idx="minor">
-            <a:schemeClr val="tx1"/>
-          </a:fontRef>
-        </p:style>
-      </p:cxnSp>
-      <p:sp>
-        <p:nvSpPr>
-          <p:cNvPr id="22" name="TextBox 21"/>
-          <p:cNvSpPr txBox="1"/>
-          <p:nvPr/>
-        </p:nvSpPr>
-        <p:spPr>
-          <a:xfrm>
-            <a:off x="216850" y="361950"/>
-            <a:ext cx="415498" cy="215444"/>
+            <a:off x="35496" y="279072"/>
+            <a:ext cx="2957549" cy="3798000"/>
           </a:xfrm>
           <a:prstGeom prst="rect">
             <a:avLst/>
           </a:prstGeom>
           <a:noFill/>
+          <a:ln>
+            <a:noFill/>
+          </a:ln>
+          <a:extLst>
+            <a:ext uri="{909E8E84-426E-40DD-AFC4-6F175D3DCCD1}">
+              <a14:hiddenFill xmlns:a14="http://schemas.microsoft.com/office/drawing/2010/main">
+                <a:solidFill>
+                  <a:schemeClr val="accent1"/>
+                </a:solidFill>
+              </a14:hiddenFill>
+            </a:ext>
+            <a:ext uri="{91240B29-F687-4F45-9708-019B960494DF}">
+              <a14:hiddenLine xmlns:a14="http://schemas.microsoft.com/office/drawing/2010/main" w="9525">
+                <a:solidFill>
+                  <a:schemeClr val="tx1"/>
+                </a:solidFill>
+                <a:miter lim="800000"/>
+                <a:headEnd/>
+                <a:tailEnd/>
+              </a14:hiddenLine>
+            </a:ext>
+          </a:extLst>
         </p:spPr>
-        <p:txBody>
-          <a:bodyPr wrap="none" rtlCol="0">
-            <a:spAutoFit/>
-          </a:bodyPr>
-          <a:lstStyle/>
-          <a:p>
-            <a:r>
-              <a:rPr lang="en-AU" sz="800" dirty="0" smtClean="0">
-                <a:latin typeface="Arial" panose="020B0604020202020204" pitchFamily="34" charset="0"/>
-                <a:cs typeface="Arial" panose="020B0604020202020204" pitchFamily="34" charset="0"/>
-              </a:rPr>
-              <a:t>Input</a:t>
-            </a:r>
-            <a:endParaRPr lang="en-AU" sz="800" dirty="0">
-              <a:latin typeface="Arial" panose="020B0604020202020204" pitchFamily="34" charset="0"/>
-              <a:cs typeface="Arial" panose="020B0604020202020204" pitchFamily="34" charset="0"/>
-            </a:endParaRPr>
-          </a:p>
-        </p:txBody>
-      </p:sp>
-      <p:sp>
-        <p:nvSpPr>
-          <p:cNvPr id="23" name="TextBox 22"/>
-          <p:cNvSpPr txBox="1"/>
-          <p:nvPr/>
-        </p:nvSpPr>
-        <p:spPr>
-          <a:xfrm>
-            <a:off x="175608" y="2374900"/>
-            <a:ext cx="495649" cy="215444"/>
-          </a:xfrm>
-          <a:prstGeom prst="rect">
-            <a:avLst/>
-          </a:prstGeom>
-          <a:noFill/>
-        </p:spPr>
-        <p:txBody>
-          <a:bodyPr wrap="none" rtlCol="0">
-            <a:spAutoFit/>
-          </a:bodyPr>
-          <a:lstStyle/>
-          <a:p>
-            <a:r>
-              <a:rPr lang="en-AU" sz="800" dirty="0" smtClean="0">
-                <a:latin typeface="Arial" panose="020B0604020202020204" pitchFamily="34" charset="0"/>
-                <a:cs typeface="Arial" panose="020B0604020202020204" pitchFamily="34" charset="0"/>
-              </a:rPr>
-              <a:t>Output</a:t>
-            </a:r>
-            <a:endParaRPr lang="en-AU" sz="800" dirty="0">
-              <a:latin typeface="Arial" panose="020B0604020202020204" pitchFamily="34" charset="0"/>
-              <a:cs typeface="Arial" panose="020B0604020202020204" pitchFamily="34" charset="0"/>
-            </a:endParaRPr>
-          </a:p>
-        </p:txBody>
-      </p:sp>
-      <p:cxnSp>
-        <p:nvCxnSpPr>
-          <p:cNvPr id="24" name="Straight Connector 23"/>
-          <p:cNvCxnSpPr/>
-          <p:nvPr/>
-        </p:nvCxnSpPr>
-        <p:spPr>
-          <a:xfrm>
-            <a:off x="360000" y="564804"/>
-            <a:ext cx="2417" cy="205200"/>
-          </a:xfrm>
-          <a:prstGeom prst="line">
-            <a:avLst/>
-          </a:prstGeom>
-          <a:ln w="12700">
-            <a:solidFill>
-              <a:schemeClr val="tx1"/>
-            </a:solidFill>
-          </a:ln>
-        </p:spPr>
-        <p:style>
-          <a:lnRef idx="1">
-            <a:schemeClr val="accent1"/>
-          </a:lnRef>
-          <a:fillRef idx="0">
-            <a:schemeClr val="accent1"/>
-          </a:fillRef>
-          <a:effectRef idx="0">
-            <a:schemeClr val="accent1"/>
-          </a:effectRef>
-          <a:fontRef idx="minor">
-            <a:schemeClr val="tx1"/>
-          </a:fontRef>
-        </p:style>
-      </p:cxnSp>
-      <p:sp>
-        <p:nvSpPr>
-          <p:cNvPr id="25" name="Rectangle 24"/>
-          <p:cNvSpPr/>
-          <p:nvPr/>
-        </p:nvSpPr>
-        <p:spPr>
-          <a:xfrm>
-            <a:off x="0" y="0"/>
-            <a:ext cx="2879725" cy="2879725"/>
-          </a:xfrm>
-          <a:prstGeom prst="rect">
-            <a:avLst/>
-          </a:prstGeom>
-          <a:noFill/>
-          <a:ln w="9525"/>
-        </p:spPr>
-        <p:style>
-          <a:lnRef idx="2">
-            <a:schemeClr val="accent1">
-              <a:shade val="50000"/>
-            </a:schemeClr>
-          </a:lnRef>
-          <a:fillRef idx="1">
-            <a:schemeClr val="accent1"/>
-          </a:fillRef>
-          <a:effectRef idx="0">
-            <a:schemeClr val="accent1"/>
-          </a:effectRef>
-          <a:fontRef idx="minor">
-            <a:schemeClr val="lt1"/>
-          </a:fontRef>
-        </p:style>
-        <p:txBody>
-          <a:bodyPr rtlCol="0" anchor="ctr"/>
-          <a:lstStyle/>
-          <a:p>
-            <a:pPr algn="ctr"/>
-            <a:endParaRPr lang="en-AU"/>
-          </a:p>
-        </p:txBody>
-      </p:sp>
-      <p:sp>
-        <p:nvSpPr>
-          <p:cNvPr id="26" name="Rectangle 25"/>
-          <p:cNvSpPr/>
-          <p:nvPr/>
-        </p:nvSpPr>
-        <p:spPr>
-          <a:xfrm>
-            <a:off x="0" y="0"/>
-            <a:ext cx="2879725" cy="1440000"/>
-          </a:xfrm>
-          <a:prstGeom prst="rect">
-            <a:avLst/>
-          </a:prstGeom>
-          <a:noFill/>
-          <a:ln w="9525"/>
-        </p:spPr>
-        <p:style>
-          <a:lnRef idx="2">
-            <a:schemeClr val="accent1">
-              <a:shade val="50000"/>
-            </a:schemeClr>
-          </a:lnRef>
-          <a:fillRef idx="1">
-            <a:schemeClr val="accent1"/>
-          </a:fillRef>
-          <a:effectRef idx="0">
-            <a:schemeClr val="accent1"/>
-          </a:effectRef>
-          <a:fontRef idx="minor">
-            <a:schemeClr val="lt1"/>
-          </a:fontRef>
-        </p:style>
-        <p:txBody>
-          <a:bodyPr rtlCol="0" anchor="ctr"/>
-          <a:lstStyle/>
-          <a:p>
-            <a:pPr algn="ctr"/>
-            <a:endParaRPr lang="en-AU"/>
-          </a:p>
-        </p:txBody>
-      </p:sp>
-      <p:sp>
-        <p:nvSpPr>
-          <p:cNvPr id="27" name="Rectangle 26"/>
-          <p:cNvSpPr/>
-          <p:nvPr/>
-        </p:nvSpPr>
-        <p:spPr>
-          <a:xfrm>
-            <a:off x="720000" y="0"/>
-            <a:ext cx="2160000" cy="2880000"/>
-          </a:xfrm>
-          <a:prstGeom prst="rect">
-            <a:avLst/>
-          </a:prstGeom>
-          <a:noFill/>
-          <a:ln w="9525"/>
-        </p:spPr>
-        <p:style>
-          <a:lnRef idx="2">
-            <a:schemeClr val="accent1">
-              <a:shade val="50000"/>
-            </a:schemeClr>
-          </a:lnRef>
-          <a:fillRef idx="1">
-            <a:schemeClr val="accent1"/>
-          </a:fillRef>
-          <a:effectRef idx="0">
-            <a:schemeClr val="accent1"/>
-          </a:effectRef>
-          <a:fontRef idx="minor">
-            <a:schemeClr val="lt1"/>
-          </a:fontRef>
-        </p:style>
-        <p:txBody>
-          <a:bodyPr rtlCol="0" anchor="ctr"/>
-          <a:lstStyle/>
-          <a:p>
-            <a:pPr algn="ctr"/>
-            <a:endParaRPr lang="en-AU"/>
-          </a:p>
-        </p:txBody>
-      </p:sp>
+      </p:pic>
     </p:spTree>
     <p:extLst>
       <p:ext uri="{BB962C8B-B14F-4D97-AF65-F5344CB8AC3E}">
-        <p14:creationId xmlns:p14="http://schemas.microsoft.com/office/powerpoint/2010/main" val="278992311"/>
+        <p14:creationId xmlns:p14="http://schemas.microsoft.com/office/powerpoint/2010/main" val="3227314395"/>
       </p:ext>
     </p:extLst>
   </p:cSld>

</xml_diff>

<commit_message>
All four animal seizure results have been added to EstimationFigure.pptx
</commit_message>
<xml_diff>
--- a/fig/EstimationFigures.pptx
+++ b/fig/EstimationFigures.pptx
@@ -3615,10 +3615,6 @@
               </a:rPr>
               <a:t>B</a:t>
             </a:r>
-            <a:endParaRPr lang="en-AU" sz="1200" b="1" dirty="0">
-              <a:latin typeface="Arial" panose="020B0604020202020204" pitchFamily="34" charset="0"/>
-              <a:cs typeface="Arial" panose="020B0604020202020204" pitchFamily="34" charset="0"/>
-            </a:endParaRPr>
           </a:p>
         </p:txBody>
       </p:sp>
@@ -3651,10 +3647,6 @@
               </a:rPr>
               <a:t>C</a:t>
             </a:r>
-            <a:endParaRPr lang="en-AU" sz="1200" b="1" dirty="0">
-              <a:latin typeface="Arial" panose="020B0604020202020204" pitchFamily="34" charset="0"/>
-              <a:cs typeface="Arial" panose="020B0604020202020204" pitchFamily="34" charset="0"/>
-            </a:endParaRPr>
           </a:p>
         </p:txBody>
       </p:sp>
@@ -3687,10 +3679,6 @@
               </a:rPr>
               <a:t>D</a:t>
             </a:r>
-            <a:endParaRPr lang="en-AU" sz="1200" b="1" dirty="0">
-              <a:latin typeface="Arial" panose="020B0604020202020204" pitchFamily="34" charset="0"/>
-              <a:cs typeface="Arial" panose="020B0604020202020204" pitchFamily="34" charset="0"/>
-            </a:endParaRPr>
           </a:p>
         </p:txBody>
       </p:sp>
@@ -3821,6 +3809,58 @@
           <a:xfrm>
             <a:off x="35496" y="279072"/>
             <a:ext cx="2957549" cy="3798000"/>
+          </a:xfrm>
+          <a:prstGeom prst="rect">
+            <a:avLst/>
+          </a:prstGeom>
+          <a:noFill/>
+          <a:ln>
+            <a:noFill/>
+          </a:ln>
+          <a:extLst>
+            <a:ext uri="{909E8E84-426E-40DD-AFC4-6F175D3DCCD1}">
+              <a14:hiddenFill xmlns:a14="http://schemas.microsoft.com/office/drawing/2010/main">
+                <a:solidFill>
+                  <a:schemeClr val="accent1"/>
+                </a:solidFill>
+              </a14:hiddenFill>
+            </a:ext>
+            <a:ext uri="{91240B29-F687-4F45-9708-019B960494DF}">
+              <a14:hiddenLine xmlns:a14="http://schemas.microsoft.com/office/drawing/2010/main" w="9525">
+                <a:solidFill>
+                  <a:schemeClr val="tx1"/>
+                </a:solidFill>
+                <a:miter lim="800000"/>
+                <a:headEnd/>
+                <a:tailEnd/>
+              </a14:hiddenLine>
+            </a:ext>
+          </a:extLst>
+        </p:spPr>
+      </p:pic>
+      <p:pic>
+        <p:nvPicPr>
+          <p:cNvPr id="2" name="Picture 2"/>
+          <p:cNvPicPr>
+            <a:picLocks noChangeAspect="1" noChangeArrowheads="1"/>
+          </p:cNvPicPr>
+          <p:nvPr/>
+        </p:nvPicPr>
+        <p:blipFill rotWithShape="1">
+          <a:blip r:embed="rId5" cstate="print">
+            <a:extLst>
+              <a:ext uri="{28A0092B-C50C-407E-A947-70E740481C1C}">
+                <a14:useLocalDpi xmlns:a14="http://schemas.microsoft.com/office/drawing/2010/main" val="0"/>
+              </a:ext>
+            </a:extLst>
+          </a:blip>
+          <a:srcRect l="2625" t="3804" r="2593" b="4238"/>
+          <a:stretch/>
+        </p:blipFill>
+        <p:spPr bwMode="auto">
+          <a:xfrm>
+            <a:off x="3132168" y="4383528"/>
+            <a:ext cx="2952000" cy="3798000"/>
           </a:xfrm>
           <a:prstGeom prst="rect">
             <a:avLst/>

</xml_diff>

<commit_message>
Figures for estimation completed
</commit_message>
<xml_diff>
--- a/fig/EstimationFigures.pptx
+++ b/fig/EstimationFigures.pptx
@@ -7,8 +7,11 @@
   <p:sldIdLst>
     <p:sldId id="257" r:id="rId2"/>
     <p:sldId id="258" r:id="rId3"/>
+    <p:sldId id="259" r:id="rId4"/>
+    <p:sldId id="260" r:id="rId5"/>
+    <p:sldId id="261" r:id="rId6"/>
   </p:sldIdLst>
-  <p:sldSz cx="9144000" cy="6858000" type="screen4x3"/>
+  <p:sldSz cx="9144000" cy="9001125"/>
   <p:notesSz cx="6858000" cy="9144000"/>
   <p:defaultTextStyle>
     <a:defPPr>
@@ -137,8 +140,8 @@
         </p:nvSpPr>
         <p:spPr>
           <a:xfrm>
-            <a:off x="685800" y="2130425"/>
-            <a:ext cx="7772400" cy="1470025"/>
+            <a:off x="685800" y="2796183"/>
+            <a:ext cx="7772400" cy="1929408"/>
           </a:xfrm>
         </p:spPr>
         <p:txBody>
@@ -165,8 +168,8 @@
         </p:nvSpPr>
         <p:spPr>
           <a:xfrm>
-            <a:off x="1371600" y="3886200"/>
-            <a:ext cx="6400800" cy="1752600"/>
+            <a:off x="1371600" y="5100637"/>
+            <a:ext cx="6400800" cy="2300288"/>
           </a:xfrm>
         </p:spPr>
         <p:txBody>
@@ -289,7 +292,8 @@
           <a:p>
             <a:fld id="{23031417-08DC-4991-BA64-45FCA174C9D0}" type="datetimeFigureOut">
               <a:rPr lang="en-AU" smtClean="0"/>
-              <a:t>20/09/2013</a:t>
+              <a:pPr/>
+              <a:t>23/09/2013</a:t>
             </a:fld>
             <a:endParaRPr lang="en-AU"/>
           </a:p>
@@ -331,6 +335,7 @@
           <a:p>
             <a:fld id="{6F8D6B36-801A-43CC-A1E7-E45D6E11502E}" type="slidenum">
               <a:rPr lang="en-AU" smtClean="0"/>
+              <a:pPr/>
               <a:t>‹#›</a:t>
             </a:fld>
             <a:endParaRPr lang="en-AU"/>
@@ -340,7 +345,7 @@
     </p:spTree>
     <p:extLst>
       <p:ext uri="{BB962C8B-B14F-4D97-AF65-F5344CB8AC3E}">
-        <p14:creationId xmlns:p14="http://schemas.microsoft.com/office/powerpoint/2010/main" val="1088028021"/>
+        <p14:creationId xmlns="" xmlns:p14="http://schemas.microsoft.com/office/powerpoint/2010/main" val="1088028021"/>
       </p:ext>
     </p:extLst>
   </p:cSld>
@@ -459,7 +464,8 @@
           <a:p>
             <a:fld id="{23031417-08DC-4991-BA64-45FCA174C9D0}" type="datetimeFigureOut">
               <a:rPr lang="en-AU" smtClean="0"/>
-              <a:t>20/09/2013</a:t>
+              <a:pPr/>
+              <a:t>23/09/2013</a:t>
             </a:fld>
             <a:endParaRPr lang="en-AU"/>
           </a:p>
@@ -501,6 +507,7 @@
           <a:p>
             <a:fld id="{6F8D6B36-801A-43CC-A1E7-E45D6E11502E}" type="slidenum">
               <a:rPr lang="en-AU" smtClean="0"/>
+              <a:pPr/>
               <a:t>‹#›</a:t>
             </a:fld>
             <a:endParaRPr lang="en-AU"/>
@@ -510,7 +517,7 @@
     </p:spTree>
     <p:extLst>
       <p:ext uri="{BB962C8B-B14F-4D97-AF65-F5344CB8AC3E}">
-        <p14:creationId xmlns:p14="http://schemas.microsoft.com/office/powerpoint/2010/main" val="1651409770"/>
+        <p14:creationId xmlns="" xmlns:p14="http://schemas.microsoft.com/office/powerpoint/2010/main" val="1651409770"/>
       </p:ext>
     </p:extLst>
   </p:cSld>
@@ -549,8 +556,8 @@
         </p:nvSpPr>
         <p:spPr>
           <a:xfrm>
-            <a:off x="6629400" y="274638"/>
-            <a:ext cx="2057400" cy="5851525"/>
+            <a:off x="6629400" y="360464"/>
+            <a:ext cx="2057400" cy="7680127"/>
           </a:xfrm>
         </p:spPr>
         <p:txBody>
@@ -577,8 +584,8 @@
         </p:nvSpPr>
         <p:spPr>
           <a:xfrm>
-            <a:off x="457200" y="274638"/>
-            <a:ext cx="6019800" cy="5851525"/>
+            <a:off x="457200" y="360464"/>
+            <a:ext cx="6019800" cy="7680127"/>
           </a:xfrm>
         </p:spPr>
         <p:txBody>
@@ -639,7 +646,8 @@
           <a:p>
             <a:fld id="{23031417-08DC-4991-BA64-45FCA174C9D0}" type="datetimeFigureOut">
               <a:rPr lang="en-AU" smtClean="0"/>
-              <a:t>20/09/2013</a:t>
+              <a:pPr/>
+              <a:t>23/09/2013</a:t>
             </a:fld>
             <a:endParaRPr lang="en-AU"/>
           </a:p>
@@ -681,6 +689,7 @@
           <a:p>
             <a:fld id="{6F8D6B36-801A-43CC-A1E7-E45D6E11502E}" type="slidenum">
               <a:rPr lang="en-AU" smtClean="0"/>
+              <a:pPr/>
               <a:t>‹#›</a:t>
             </a:fld>
             <a:endParaRPr lang="en-AU"/>
@@ -690,7 +699,7 @@
     </p:spTree>
     <p:extLst>
       <p:ext uri="{BB962C8B-B14F-4D97-AF65-F5344CB8AC3E}">
-        <p14:creationId xmlns:p14="http://schemas.microsoft.com/office/powerpoint/2010/main" val="434562314"/>
+        <p14:creationId xmlns="" xmlns:p14="http://schemas.microsoft.com/office/powerpoint/2010/main" val="434562314"/>
       </p:ext>
     </p:extLst>
   </p:cSld>
@@ -809,7 +818,8 @@
           <a:p>
             <a:fld id="{23031417-08DC-4991-BA64-45FCA174C9D0}" type="datetimeFigureOut">
               <a:rPr lang="en-AU" smtClean="0"/>
-              <a:t>20/09/2013</a:t>
+              <a:pPr/>
+              <a:t>23/09/2013</a:t>
             </a:fld>
             <a:endParaRPr lang="en-AU"/>
           </a:p>
@@ -851,6 +861,7 @@
           <a:p>
             <a:fld id="{6F8D6B36-801A-43CC-A1E7-E45D6E11502E}" type="slidenum">
               <a:rPr lang="en-AU" smtClean="0"/>
+              <a:pPr/>
               <a:t>‹#›</a:t>
             </a:fld>
             <a:endParaRPr lang="en-AU"/>
@@ -860,7 +871,7 @@
     </p:spTree>
     <p:extLst>
       <p:ext uri="{BB962C8B-B14F-4D97-AF65-F5344CB8AC3E}">
-        <p14:creationId xmlns:p14="http://schemas.microsoft.com/office/powerpoint/2010/main" val="3995899577"/>
+        <p14:creationId xmlns="" xmlns:p14="http://schemas.microsoft.com/office/powerpoint/2010/main" val="3995899577"/>
       </p:ext>
     </p:extLst>
   </p:cSld>
@@ -899,8 +910,8 @@
         </p:nvSpPr>
         <p:spPr>
           <a:xfrm>
-            <a:off x="722313" y="4406900"/>
-            <a:ext cx="7772400" cy="1362075"/>
+            <a:off x="722313" y="5784058"/>
+            <a:ext cx="7772400" cy="1787723"/>
           </a:xfrm>
         </p:spPr>
         <p:txBody>
@@ -931,8 +942,8 @@
         </p:nvSpPr>
         <p:spPr>
           <a:xfrm>
-            <a:off x="722313" y="2906713"/>
-            <a:ext cx="7772400" cy="1500187"/>
+            <a:off x="722313" y="3815063"/>
+            <a:ext cx="7772400" cy="1968995"/>
           </a:xfrm>
         </p:spPr>
         <p:txBody>
@@ -1055,7 +1066,8 @@
           <a:p>
             <a:fld id="{23031417-08DC-4991-BA64-45FCA174C9D0}" type="datetimeFigureOut">
               <a:rPr lang="en-AU" smtClean="0"/>
-              <a:t>20/09/2013</a:t>
+              <a:pPr/>
+              <a:t>23/09/2013</a:t>
             </a:fld>
             <a:endParaRPr lang="en-AU"/>
           </a:p>
@@ -1097,6 +1109,7 @@
           <a:p>
             <a:fld id="{6F8D6B36-801A-43CC-A1E7-E45D6E11502E}" type="slidenum">
               <a:rPr lang="en-AU" smtClean="0"/>
+              <a:pPr/>
               <a:t>‹#›</a:t>
             </a:fld>
             <a:endParaRPr lang="en-AU"/>
@@ -1106,7 +1119,7 @@
     </p:spTree>
     <p:extLst>
       <p:ext uri="{BB962C8B-B14F-4D97-AF65-F5344CB8AC3E}">
-        <p14:creationId xmlns:p14="http://schemas.microsoft.com/office/powerpoint/2010/main" val="4194826409"/>
+        <p14:creationId xmlns="" xmlns:p14="http://schemas.microsoft.com/office/powerpoint/2010/main" val="4194826409"/>
       </p:ext>
     </p:extLst>
   </p:cSld>
@@ -1168,8 +1181,8 @@
         </p:nvSpPr>
         <p:spPr>
           <a:xfrm>
-            <a:off x="457200" y="1600200"/>
-            <a:ext cx="4038600" cy="4525963"/>
+            <a:off x="457200" y="2100265"/>
+            <a:ext cx="4038600" cy="5940326"/>
           </a:xfrm>
         </p:spPr>
         <p:txBody>
@@ -1253,8 +1266,8 @@
         </p:nvSpPr>
         <p:spPr>
           <a:xfrm>
-            <a:off x="4648200" y="1600200"/>
-            <a:ext cx="4038600" cy="4525963"/>
+            <a:off x="4648200" y="2100265"/>
+            <a:ext cx="4038600" cy="5940326"/>
           </a:xfrm>
         </p:spPr>
         <p:txBody>
@@ -1343,7 +1356,8 @@
           <a:p>
             <a:fld id="{23031417-08DC-4991-BA64-45FCA174C9D0}" type="datetimeFigureOut">
               <a:rPr lang="en-AU" smtClean="0"/>
-              <a:t>20/09/2013</a:t>
+              <a:pPr/>
+              <a:t>23/09/2013</a:t>
             </a:fld>
             <a:endParaRPr lang="en-AU"/>
           </a:p>
@@ -1385,6 +1399,7 @@
           <a:p>
             <a:fld id="{6F8D6B36-801A-43CC-A1E7-E45D6E11502E}" type="slidenum">
               <a:rPr lang="en-AU" smtClean="0"/>
+              <a:pPr/>
               <a:t>‹#›</a:t>
             </a:fld>
             <a:endParaRPr lang="en-AU"/>
@@ -1394,7 +1409,7 @@
     </p:spTree>
     <p:extLst>
       <p:ext uri="{BB962C8B-B14F-4D97-AF65-F5344CB8AC3E}">
-        <p14:creationId xmlns:p14="http://schemas.microsoft.com/office/powerpoint/2010/main" val="1940354534"/>
+        <p14:creationId xmlns="" xmlns:p14="http://schemas.microsoft.com/office/powerpoint/2010/main" val="1940354534"/>
       </p:ext>
     </p:extLst>
   </p:cSld>
@@ -1460,8 +1475,8 @@
         </p:nvSpPr>
         <p:spPr>
           <a:xfrm>
-            <a:off x="457200" y="1535113"/>
-            <a:ext cx="4040188" cy="639762"/>
+            <a:off x="457200" y="2014836"/>
+            <a:ext cx="4040188" cy="839688"/>
           </a:xfrm>
         </p:spPr>
         <p:txBody>
@@ -1525,8 +1540,8 @@
         </p:nvSpPr>
         <p:spPr>
           <a:xfrm>
-            <a:off x="457200" y="2174875"/>
-            <a:ext cx="4040188" cy="3951288"/>
+            <a:off x="457200" y="2854523"/>
+            <a:ext cx="4040188" cy="5186066"/>
           </a:xfrm>
         </p:spPr>
         <p:txBody>
@@ -1610,8 +1625,8 @@
         </p:nvSpPr>
         <p:spPr>
           <a:xfrm>
-            <a:off x="4645025" y="1535113"/>
-            <a:ext cx="4041775" cy="639762"/>
+            <a:off x="4645028" y="2014836"/>
+            <a:ext cx="4041775" cy="839688"/>
           </a:xfrm>
         </p:spPr>
         <p:txBody>
@@ -1675,8 +1690,8 @@
         </p:nvSpPr>
         <p:spPr>
           <a:xfrm>
-            <a:off x="4645025" y="2174875"/>
-            <a:ext cx="4041775" cy="3951288"/>
+            <a:off x="4645028" y="2854523"/>
+            <a:ext cx="4041775" cy="5186066"/>
           </a:xfrm>
         </p:spPr>
         <p:txBody>
@@ -1765,7 +1780,8 @@
           <a:p>
             <a:fld id="{23031417-08DC-4991-BA64-45FCA174C9D0}" type="datetimeFigureOut">
               <a:rPr lang="en-AU" smtClean="0"/>
-              <a:t>20/09/2013</a:t>
+              <a:pPr/>
+              <a:t>23/09/2013</a:t>
             </a:fld>
             <a:endParaRPr lang="en-AU"/>
           </a:p>
@@ -1807,6 +1823,7 @@
           <a:p>
             <a:fld id="{6F8D6B36-801A-43CC-A1E7-E45D6E11502E}" type="slidenum">
               <a:rPr lang="en-AU" smtClean="0"/>
+              <a:pPr/>
               <a:t>‹#›</a:t>
             </a:fld>
             <a:endParaRPr lang="en-AU"/>
@@ -1816,7 +1833,7 @@
     </p:spTree>
     <p:extLst>
       <p:ext uri="{BB962C8B-B14F-4D97-AF65-F5344CB8AC3E}">
-        <p14:creationId xmlns:p14="http://schemas.microsoft.com/office/powerpoint/2010/main" val="344776633"/>
+        <p14:creationId xmlns="" xmlns:p14="http://schemas.microsoft.com/office/powerpoint/2010/main" val="344776633"/>
       </p:ext>
     </p:extLst>
   </p:cSld>
@@ -1883,7 +1900,8 @@
           <a:p>
             <a:fld id="{23031417-08DC-4991-BA64-45FCA174C9D0}" type="datetimeFigureOut">
               <a:rPr lang="en-AU" smtClean="0"/>
-              <a:t>20/09/2013</a:t>
+              <a:pPr/>
+              <a:t>23/09/2013</a:t>
             </a:fld>
             <a:endParaRPr lang="en-AU"/>
           </a:p>
@@ -1925,6 +1943,7 @@
           <a:p>
             <a:fld id="{6F8D6B36-801A-43CC-A1E7-E45D6E11502E}" type="slidenum">
               <a:rPr lang="en-AU" smtClean="0"/>
+              <a:pPr/>
               <a:t>‹#›</a:t>
             </a:fld>
             <a:endParaRPr lang="en-AU"/>
@@ -1934,7 +1953,7 @@
     </p:spTree>
     <p:extLst>
       <p:ext uri="{BB962C8B-B14F-4D97-AF65-F5344CB8AC3E}">
-        <p14:creationId xmlns:p14="http://schemas.microsoft.com/office/powerpoint/2010/main" val="1569838215"/>
+        <p14:creationId xmlns="" xmlns:p14="http://schemas.microsoft.com/office/powerpoint/2010/main" val="1569838215"/>
       </p:ext>
     </p:extLst>
   </p:cSld>
@@ -1978,7 +1997,8 @@
           <a:p>
             <a:fld id="{23031417-08DC-4991-BA64-45FCA174C9D0}" type="datetimeFigureOut">
               <a:rPr lang="en-AU" smtClean="0"/>
-              <a:t>20/09/2013</a:t>
+              <a:pPr/>
+              <a:t>23/09/2013</a:t>
             </a:fld>
             <a:endParaRPr lang="en-AU"/>
           </a:p>
@@ -2020,6 +2040,7 @@
           <a:p>
             <a:fld id="{6F8D6B36-801A-43CC-A1E7-E45D6E11502E}" type="slidenum">
               <a:rPr lang="en-AU" smtClean="0"/>
+              <a:pPr/>
               <a:t>‹#›</a:t>
             </a:fld>
             <a:endParaRPr lang="en-AU"/>
@@ -2029,7 +2050,7 @@
     </p:spTree>
     <p:extLst>
       <p:ext uri="{BB962C8B-B14F-4D97-AF65-F5344CB8AC3E}">
-        <p14:creationId xmlns:p14="http://schemas.microsoft.com/office/powerpoint/2010/main" val="1917389887"/>
+        <p14:creationId xmlns="" xmlns:p14="http://schemas.microsoft.com/office/powerpoint/2010/main" val="1917389887"/>
       </p:ext>
     </p:extLst>
   </p:cSld>
@@ -2068,8 +2089,8 @@
         </p:nvSpPr>
         <p:spPr>
           <a:xfrm>
-            <a:off x="457200" y="273050"/>
-            <a:ext cx="3008313" cy="1162050"/>
+            <a:off x="457202" y="358379"/>
+            <a:ext cx="3008313" cy="1525191"/>
           </a:xfrm>
         </p:spPr>
         <p:txBody>
@@ -2100,8 +2121,8 @@
         </p:nvSpPr>
         <p:spPr>
           <a:xfrm>
-            <a:off x="3575050" y="273050"/>
-            <a:ext cx="5111750" cy="5853113"/>
+            <a:off x="3575050" y="358380"/>
+            <a:ext cx="5111750" cy="7682211"/>
           </a:xfrm>
         </p:spPr>
         <p:txBody>
@@ -2185,8 +2206,8 @@
         </p:nvSpPr>
         <p:spPr>
           <a:xfrm>
-            <a:off x="457200" y="1435100"/>
-            <a:ext cx="3008313" cy="4691063"/>
+            <a:off x="457202" y="1883571"/>
+            <a:ext cx="3008313" cy="6157020"/>
           </a:xfrm>
         </p:spPr>
         <p:txBody>
@@ -2255,7 +2276,8 @@
           <a:p>
             <a:fld id="{23031417-08DC-4991-BA64-45FCA174C9D0}" type="datetimeFigureOut">
               <a:rPr lang="en-AU" smtClean="0"/>
-              <a:t>20/09/2013</a:t>
+              <a:pPr/>
+              <a:t>23/09/2013</a:t>
             </a:fld>
             <a:endParaRPr lang="en-AU"/>
           </a:p>
@@ -2297,6 +2319,7 @@
           <a:p>
             <a:fld id="{6F8D6B36-801A-43CC-A1E7-E45D6E11502E}" type="slidenum">
               <a:rPr lang="en-AU" smtClean="0"/>
+              <a:pPr/>
               <a:t>‹#›</a:t>
             </a:fld>
             <a:endParaRPr lang="en-AU"/>
@@ -2306,7 +2329,7 @@
     </p:spTree>
     <p:extLst>
       <p:ext uri="{BB962C8B-B14F-4D97-AF65-F5344CB8AC3E}">
-        <p14:creationId xmlns:p14="http://schemas.microsoft.com/office/powerpoint/2010/main" val="3220937641"/>
+        <p14:creationId xmlns="" xmlns:p14="http://schemas.microsoft.com/office/powerpoint/2010/main" val="3220937641"/>
       </p:ext>
     </p:extLst>
   </p:cSld>
@@ -2345,8 +2368,8 @@
         </p:nvSpPr>
         <p:spPr>
           <a:xfrm>
-            <a:off x="1792288" y="4800600"/>
-            <a:ext cx="5486400" cy="566738"/>
+            <a:off x="1792288" y="6300787"/>
+            <a:ext cx="5486400" cy="743844"/>
           </a:xfrm>
         </p:spPr>
         <p:txBody>
@@ -2377,8 +2400,8 @@
         </p:nvSpPr>
         <p:spPr>
           <a:xfrm>
-            <a:off x="1792288" y="612775"/>
-            <a:ext cx="5486400" cy="4114800"/>
+            <a:off x="1792288" y="804267"/>
+            <a:ext cx="5486400" cy="5400675"/>
           </a:xfrm>
         </p:spPr>
         <p:txBody>
@@ -2438,8 +2461,8 @@
         </p:nvSpPr>
         <p:spPr>
           <a:xfrm>
-            <a:off x="1792288" y="5367338"/>
-            <a:ext cx="5486400" cy="804862"/>
+            <a:off x="1792288" y="7044633"/>
+            <a:ext cx="5486400" cy="1056381"/>
           </a:xfrm>
         </p:spPr>
         <p:txBody>
@@ -2508,7 +2531,8 @@
           <a:p>
             <a:fld id="{23031417-08DC-4991-BA64-45FCA174C9D0}" type="datetimeFigureOut">
               <a:rPr lang="en-AU" smtClean="0"/>
-              <a:t>20/09/2013</a:t>
+              <a:pPr/>
+              <a:t>23/09/2013</a:t>
             </a:fld>
             <a:endParaRPr lang="en-AU"/>
           </a:p>
@@ -2550,6 +2574,7 @@
           <a:p>
             <a:fld id="{6F8D6B36-801A-43CC-A1E7-E45D6E11502E}" type="slidenum">
               <a:rPr lang="en-AU" smtClean="0"/>
+              <a:pPr/>
               <a:t>‹#›</a:t>
             </a:fld>
             <a:endParaRPr lang="en-AU"/>
@@ -2559,7 +2584,7 @@
     </p:spTree>
     <p:extLst>
       <p:ext uri="{BB962C8B-B14F-4D97-AF65-F5344CB8AC3E}">
-        <p14:creationId xmlns:p14="http://schemas.microsoft.com/office/powerpoint/2010/main" val="1649930473"/>
+        <p14:creationId xmlns="" xmlns:p14="http://schemas.microsoft.com/office/powerpoint/2010/main" val="1649930473"/>
       </p:ext>
     </p:extLst>
   </p:cSld>
@@ -2603,8 +2628,8 @@
         </p:nvSpPr>
         <p:spPr>
           <a:xfrm>
-            <a:off x="457200" y="274638"/>
-            <a:ext cx="8229600" cy="1143000"/>
+            <a:off x="457200" y="360462"/>
+            <a:ext cx="8229600" cy="1500188"/>
           </a:xfrm>
           <a:prstGeom prst="rect">
             <a:avLst/>
@@ -2636,8 +2661,8 @@
         </p:nvSpPr>
         <p:spPr>
           <a:xfrm>
-            <a:off x="457200" y="1600200"/>
-            <a:ext cx="8229600" cy="4525963"/>
+            <a:off x="457200" y="2100265"/>
+            <a:ext cx="8229600" cy="5940326"/>
           </a:xfrm>
           <a:prstGeom prst="rect">
             <a:avLst/>
@@ -2698,8 +2723,8 @@
         </p:nvSpPr>
         <p:spPr>
           <a:xfrm>
-            <a:off x="457200" y="6356350"/>
-            <a:ext cx="2133600" cy="365125"/>
+            <a:off x="457200" y="8342711"/>
+            <a:ext cx="2133600" cy="479227"/>
           </a:xfrm>
           <a:prstGeom prst="rect">
             <a:avLst/>
@@ -2721,7 +2746,8 @@
           <a:p>
             <a:fld id="{23031417-08DC-4991-BA64-45FCA174C9D0}" type="datetimeFigureOut">
               <a:rPr lang="en-AU" smtClean="0"/>
-              <a:t>20/09/2013</a:t>
+              <a:pPr/>
+              <a:t>23/09/2013</a:t>
             </a:fld>
             <a:endParaRPr lang="en-AU"/>
           </a:p>
@@ -2739,8 +2765,8 @@
         </p:nvSpPr>
         <p:spPr>
           <a:xfrm>
-            <a:off x="3124200" y="6356350"/>
-            <a:ext cx="2895600" cy="365125"/>
+            <a:off x="3124200" y="8342711"/>
+            <a:ext cx="2895600" cy="479227"/>
           </a:xfrm>
           <a:prstGeom prst="rect">
             <a:avLst/>
@@ -2776,8 +2802,8 @@
         </p:nvSpPr>
         <p:spPr>
           <a:xfrm>
-            <a:off x="6553200" y="6356350"/>
-            <a:ext cx="2133600" cy="365125"/>
+            <a:off x="6553200" y="8342711"/>
+            <a:ext cx="2133600" cy="479227"/>
           </a:xfrm>
           <a:prstGeom prst="rect">
             <a:avLst/>
@@ -2799,6 +2825,7 @@
           <a:p>
             <a:fld id="{6F8D6B36-801A-43CC-A1E7-E45D6E11502E}" type="slidenum">
               <a:rPr lang="en-AU" smtClean="0"/>
+              <a:pPr/>
               <a:t>‹#›</a:t>
             </a:fld>
             <a:endParaRPr lang="en-AU"/>
@@ -2808,7 +2835,7 @@
     </p:spTree>
     <p:extLst>
       <p:ext uri="{BB962C8B-B14F-4D97-AF65-F5344CB8AC3E}">
-        <p14:creationId xmlns:p14="http://schemas.microsoft.com/office/powerpoint/2010/main" val="477204356"/>
+        <p14:creationId xmlns="" xmlns:p14="http://schemas.microsoft.com/office/powerpoint/2010/main" val="477204356"/>
       </p:ext>
     </p:extLst>
   </p:cSld>
@@ -3104,10 +3131,10 @@
         </p:nvGrpSpPr>
         <p:grpSpPr>
           <a:xfrm>
-            <a:off x="-36512" y="404664"/>
-            <a:ext cx="2880000" cy="5403660"/>
+            <a:off x="-36512" y="531121"/>
+            <a:ext cx="2880000" cy="6601785"/>
             <a:chOff x="0" y="0"/>
-            <a:chExt cx="2880000" cy="5403660"/>
+            <a:chExt cx="2880000" cy="5029931"/>
           </a:xfrm>
         </p:grpSpPr>
         <p:grpSp>
@@ -3119,9 +3146,9 @@
           <p:grpSpPr>
             <a:xfrm>
               <a:off x="0" y="0"/>
-              <a:ext cx="2880000" cy="5403660"/>
+              <a:ext cx="2880000" cy="5029931"/>
               <a:chOff x="0" y="0"/>
-              <a:chExt cx="2880000" cy="5403660"/>
+              <a:chExt cx="2880000" cy="5029931"/>
             </a:xfrm>
           </p:grpSpPr>
           <p:pic>
@@ -3136,7 +3163,7 @@
               <a:blip r:embed="rId2" cstate="print">
                 <a:extLst>
                   <a:ext uri="{28A0092B-C50C-407E-A947-70E740481C1C}">
-                    <a14:useLocalDpi xmlns:a14="http://schemas.microsoft.com/office/drawing/2010/main" val="0"/>
+                    <a14:useLocalDpi xmlns="" xmlns:a14="http://schemas.microsoft.com/office/drawing/2010/main" val="0"/>
                   </a:ext>
                 </a:extLst>
               </a:blip>
@@ -3159,14 +3186,14 @@
               </a:ln>
               <a:extLst>
                 <a:ext uri="{909E8E84-426E-40DD-AFC4-6F175D3DCCD1}">
-                  <a14:hiddenFill xmlns:a14="http://schemas.microsoft.com/office/drawing/2010/main">
+                  <a14:hiddenFill xmlns="" xmlns:a14="http://schemas.microsoft.com/office/drawing/2010/main">
                     <a:solidFill>
                       <a:schemeClr val="accent1"/>
                     </a:solidFill>
                   </a14:hiddenFill>
                 </a:ext>
                 <a:ext uri="{91240B29-F687-4F45-9708-019B960494DF}">
-                  <a14:hiddenLine xmlns:a14="http://schemas.microsoft.com/office/drawing/2010/main" w="9525">
+                  <a14:hiddenLine xmlns="" xmlns:a14="http://schemas.microsoft.com/office/drawing/2010/main" w="9525">
                     <a:solidFill>
                       <a:schemeClr val="tx1"/>
                     </a:solidFill>
@@ -3187,7 +3214,7 @@
             <p:spPr>
               <a:xfrm>
                 <a:off x="107504" y="3834000"/>
-                <a:ext cx="2664296" cy="1569660"/>
+                <a:ext cx="2664296" cy="1195931"/>
               </a:xfrm>
               <a:prstGeom prst="rect">
                 <a:avLst/>
@@ -3238,7 +3265,7 @@
           <p:spPr>
             <a:xfrm>
               <a:off x="35496" y="188640"/>
-              <a:ext cx="295274" cy="276999"/>
+              <a:ext cx="295274" cy="211047"/>
             </a:xfrm>
             <a:prstGeom prst="rect">
               <a:avLst/>
@@ -3274,7 +3301,7 @@
           <p:spPr>
             <a:xfrm>
               <a:off x="54795" y="703819"/>
-              <a:ext cx="295274" cy="276999"/>
+              <a:ext cx="295274" cy="211047"/>
             </a:xfrm>
             <a:prstGeom prst="rect">
               <a:avLst/>
@@ -3306,7 +3333,7 @@
           <p:spPr>
             <a:xfrm>
               <a:off x="35496" y="1412776"/>
-              <a:ext cx="295274" cy="276999"/>
+              <a:ext cx="295274" cy="211047"/>
             </a:xfrm>
             <a:prstGeom prst="rect">
               <a:avLst/>
@@ -3338,7 +3365,7 @@
           <p:spPr>
             <a:xfrm>
               <a:off x="35496" y="2060848"/>
-              <a:ext cx="295274" cy="276999"/>
+              <a:ext cx="295274" cy="211047"/>
             </a:xfrm>
             <a:prstGeom prst="rect">
               <a:avLst/>
@@ -3370,7 +3397,7 @@
           <p:spPr>
             <a:xfrm>
               <a:off x="35496" y="2708920"/>
-              <a:ext cx="287258" cy="276999"/>
+              <a:ext cx="287258" cy="211047"/>
             </a:xfrm>
             <a:prstGeom prst="rect">
               <a:avLst/>
@@ -3397,7 +3424,7 @@
     </p:spTree>
     <p:extLst>
       <p:ext uri="{BB962C8B-B14F-4D97-AF65-F5344CB8AC3E}">
-        <p14:creationId xmlns:p14="http://schemas.microsoft.com/office/powerpoint/2010/main" val="3990381557"/>
+        <p14:creationId xmlns="" xmlns:p14="http://schemas.microsoft.com/office/powerpoint/2010/main" val="3990381557"/>
       </p:ext>
     </p:extLst>
   </p:cSld>
@@ -3433,7 +3460,7 @@
         <p:spPr>
           <a:xfrm>
             <a:off x="0" y="0"/>
-            <a:ext cx="6120000" cy="8280000"/>
+            <a:ext cx="6120000" cy="10867500"/>
           </a:xfrm>
           <a:prstGeom prst="rect">
             <a:avLst/>
@@ -3475,7 +3502,7 @@
         <p:spPr>
           <a:xfrm>
             <a:off x="0" y="0"/>
-            <a:ext cx="3060000" cy="8280000"/>
+            <a:ext cx="3060000" cy="10867500"/>
           </a:xfrm>
           <a:prstGeom prst="rect">
             <a:avLst/>
@@ -3516,8 +3543,8 @@
         </p:nvSpPr>
         <p:spPr>
           <a:xfrm>
-            <a:off x="0" y="0"/>
-            <a:ext cx="6120000" cy="4140000"/>
+            <a:off x="0" y="1"/>
+            <a:ext cx="6120000" cy="5433750"/>
           </a:xfrm>
           <a:prstGeom prst="rect">
             <a:avLst/>
@@ -3558,7 +3585,7 @@
         </p:nvSpPr>
         <p:spPr>
           <a:xfrm>
-            <a:off x="0" y="0"/>
+            <a:off x="0" y="2"/>
             <a:ext cx="295274" cy="276999"/>
           </a:xfrm>
           <a:prstGeom prst="rect">
@@ -3626,7 +3653,7 @@
         </p:nvSpPr>
         <p:spPr>
           <a:xfrm>
-            <a:off x="0" y="4140000"/>
+            <a:off x="0" y="5433751"/>
             <a:ext cx="295274" cy="276999"/>
           </a:xfrm>
           <a:prstGeom prst="rect">
@@ -3658,7 +3685,7 @@
         </p:nvSpPr>
         <p:spPr>
           <a:xfrm>
-            <a:off x="3060000" y="4140000"/>
+            <a:off x="3060000" y="5433751"/>
             <a:ext cx="295274" cy="276999"/>
           </a:xfrm>
           <a:prstGeom prst="rect">
@@ -3694,7 +3721,7 @@
           <a:blip r:embed="rId2" cstate="print">
             <a:extLst>
               <a:ext uri="{28A0092B-C50C-407E-A947-70E740481C1C}">
-                <a14:useLocalDpi xmlns:a14="http://schemas.microsoft.com/office/drawing/2010/main" val="0"/>
+                <a14:useLocalDpi xmlns="" xmlns:a14="http://schemas.microsoft.com/office/drawing/2010/main" val="0"/>
               </a:ext>
             </a:extLst>
           </a:blip>
@@ -3703,8 +3730,8 @@
         </p:blipFill>
         <p:spPr bwMode="auto">
           <a:xfrm>
-            <a:off x="3114168" y="279072"/>
-            <a:ext cx="2970000" cy="3798000"/>
+            <a:off x="3114168" y="366282"/>
+            <a:ext cx="2970000" cy="4984875"/>
           </a:xfrm>
           <a:prstGeom prst="rect">
             <a:avLst/>
@@ -3715,14 +3742,14 @@
           </a:ln>
           <a:extLst>
             <a:ext uri="{909E8E84-426E-40DD-AFC4-6F175D3DCCD1}">
-              <a14:hiddenFill xmlns:a14="http://schemas.microsoft.com/office/drawing/2010/main">
+              <a14:hiddenFill xmlns="" xmlns:a14="http://schemas.microsoft.com/office/drawing/2010/main">
                 <a:solidFill>
                   <a:schemeClr val="accent1"/>
                 </a:solidFill>
               </a14:hiddenFill>
             </a:ext>
             <a:ext uri="{91240B29-F687-4F45-9708-019B960494DF}">
-              <a14:hiddenLine xmlns:a14="http://schemas.microsoft.com/office/drawing/2010/main" w="9525">
+              <a14:hiddenLine xmlns="" xmlns:a14="http://schemas.microsoft.com/office/drawing/2010/main" w="9525">
                 <a:solidFill>
                   <a:schemeClr val="tx1"/>
                 </a:solidFill>
@@ -3746,7 +3773,7 @@
           <a:blip r:embed="rId3" cstate="print">
             <a:extLst>
               <a:ext uri="{28A0092B-C50C-407E-A947-70E740481C1C}">
-                <a14:useLocalDpi xmlns:a14="http://schemas.microsoft.com/office/drawing/2010/main" val="0"/>
+                <a14:useLocalDpi xmlns="" xmlns:a14="http://schemas.microsoft.com/office/drawing/2010/main" val="0"/>
               </a:ext>
             </a:extLst>
           </a:blip>
@@ -3755,8 +3782,8 @@
         </p:blipFill>
         <p:spPr bwMode="auto">
           <a:xfrm>
-            <a:off x="107504" y="4401528"/>
-            <a:ext cx="2880000" cy="3780000"/>
+            <a:off x="107504" y="5755050"/>
+            <a:ext cx="2880000" cy="4961250"/>
           </a:xfrm>
           <a:prstGeom prst="rect">
             <a:avLst/>
@@ -3767,14 +3794,14 @@
           </a:ln>
           <a:extLst>
             <a:ext uri="{909E8E84-426E-40DD-AFC4-6F175D3DCCD1}">
-              <a14:hiddenFill xmlns:a14="http://schemas.microsoft.com/office/drawing/2010/main">
+              <a14:hiddenFill xmlns="" xmlns:a14="http://schemas.microsoft.com/office/drawing/2010/main">
                 <a:solidFill>
                   <a:schemeClr val="accent1"/>
                 </a:solidFill>
               </a14:hiddenFill>
             </a:ext>
             <a:ext uri="{91240B29-F687-4F45-9708-019B960494DF}">
-              <a14:hiddenLine xmlns:a14="http://schemas.microsoft.com/office/drawing/2010/main" w="9525">
+              <a14:hiddenLine xmlns="" xmlns:a14="http://schemas.microsoft.com/office/drawing/2010/main" w="9525">
                 <a:solidFill>
                   <a:schemeClr val="tx1"/>
                 </a:solidFill>
@@ -3798,7 +3825,7 @@
           <a:blip r:embed="rId4" cstate="print">
             <a:extLst>
               <a:ext uri="{28A0092B-C50C-407E-A947-70E740481C1C}">
-                <a14:useLocalDpi xmlns:a14="http://schemas.microsoft.com/office/drawing/2010/main" val="0"/>
+                <a14:useLocalDpi xmlns="" xmlns:a14="http://schemas.microsoft.com/office/drawing/2010/main" val="0"/>
               </a:ext>
             </a:extLst>
           </a:blip>
@@ -3807,8 +3834,8 @@
         </p:blipFill>
         <p:spPr bwMode="auto">
           <a:xfrm>
-            <a:off x="35496" y="279072"/>
-            <a:ext cx="2957549" cy="3798000"/>
+            <a:off x="35497" y="366282"/>
+            <a:ext cx="2957549" cy="4984875"/>
           </a:xfrm>
           <a:prstGeom prst="rect">
             <a:avLst/>
@@ -3819,14 +3846,14 @@
           </a:ln>
           <a:extLst>
             <a:ext uri="{909E8E84-426E-40DD-AFC4-6F175D3DCCD1}">
-              <a14:hiddenFill xmlns:a14="http://schemas.microsoft.com/office/drawing/2010/main">
+              <a14:hiddenFill xmlns="" xmlns:a14="http://schemas.microsoft.com/office/drawing/2010/main">
                 <a:solidFill>
                   <a:schemeClr val="accent1"/>
                 </a:solidFill>
               </a14:hiddenFill>
             </a:ext>
             <a:ext uri="{91240B29-F687-4F45-9708-019B960494DF}">
-              <a14:hiddenLine xmlns:a14="http://schemas.microsoft.com/office/drawing/2010/main" w="9525">
+              <a14:hiddenLine xmlns="" xmlns:a14="http://schemas.microsoft.com/office/drawing/2010/main" w="9525">
                 <a:solidFill>
                   <a:schemeClr val="tx1"/>
                 </a:solidFill>
@@ -3850,7 +3877,7 @@
           <a:blip r:embed="rId5" cstate="print">
             <a:extLst>
               <a:ext uri="{28A0092B-C50C-407E-A947-70E740481C1C}">
-                <a14:useLocalDpi xmlns:a14="http://schemas.microsoft.com/office/drawing/2010/main" val="0"/>
+                <a14:useLocalDpi xmlns="" xmlns:a14="http://schemas.microsoft.com/office/drawing/2010/main" val="0"/>
               </a:ext>
             </a:extLst>
           </a:blip>
@@ -3859,8 +3886,8 @@
         </p:blipFill>
         <p:spPr bwMode="auto">
           <a:xfrm>
-            <a:off x="3132168" y="4383528"/>
-            <a:ext cx="2952000" cy="3798000"/>
+            <a:off x="3132168" y="5753381"/>
+            <a:ext cx="2952000" cy="4984875"/>
           </a:xfrm>
           <a:prstGeom prst="rect">
             <a:avLst/>
@@ -3871,14 +3898,14 @@
           </a:ln>
           <a:extLst>
             <a:ext uri="{909E8E84-426E-40DD-AFC4-6F175D3DCCD1}">
-              <a14:hiddenFill xmlns:a14="http://schemas.microsoft.com/office/drawing/2010/main">
+              <a14:hiddenFill xmlns="" xmlns:a14="http://schemas.microsoft.com/office/drawing/2010/main">
                 <a:solidFill>
                   <a:schemeClr val="accent1"/>
                 </a:solidFill>
               </a14:hiddenFill>
             </a:ext>
             <a:ext uri="{91240B29-F687-4F45-9708-019B960494DF}">
-              <a14:hiddenLine xmlns:a14="http://schemas.microsoft.com/office/drawing/2010/main" w="9525">
+              <a14:hiddenLine xmlns="" xmlns:a14="http://schemas.microsoft.com/office/drawing/2010/main" w="9525">
                 <a:solidFill>
                   <a:schemeClr val="tx1"/>
                 </a:solidFill>
@@ -3893,9 +3920,1073 @@
     </p:spTree>
     <p:extLst>
       <p:ext uri="{BB962C8B-B14F-4D97-AF65-F5344CB8AC3E}">
-        <p14:creationId xmlns:p14="http://schemas.microsoft.com/office/powerpoint/2010/main" val="3227314395"/>
+        <p14:creationId xmlns="" xmlns:p14="http://schemas.microsoft.com/office/powerpoint/2010/main" val="3227314395"/>
       </p:ext>
     </p:extLst>
+  </p:cSld>
+  <p:clrMapOvr>
+    <a:masterClrMapping/>
+  </p:clrMapOvr>
+</p:sld>
+</file>
+
+<file path=ppt/slides/slide3.xml><?xml version="1.0" encoding="utf-8"?>
+<p:sld xmlns:a="http://schemas.openxmlformats.org/drawingml/2006/main" xmlns:r="http://schemas.openxmlformats.org/officeDocument/2006/relationships" xmlns:p="http://schemas.openxmlformats.org/presentationml/2006/main">
+  <p:cSld>
+    <p:spTree>
+      <p:nvGrpSpPr>
+        <p:cNvPr id="1" name=""/>
+        <p:cNvGrpSpPr/>
+        <p:nvPr/>
+      </p:nvGrpSpPr>
+      <p:grpSpPr>
+        <a:xfrm>
+          <a:off x="0" y="0"/>
+          <a:ext cx="0" cy="0"/>
+          <a:chOff x="0" y="0"/>
+          <a:chExt cx="0" cy="0"/>
+        </a:xfrm>
+      </p:grpSpPr>
+      <p:grpSp>
+        <p:nvGrpSpPr>
+          <p:cNvPr id="14" name="Group 13"/>
+          <p:cNvGrpSpPr/>
+          <p:nvPr/>
+        </p:nvGrpSpPr>
+        <p:grpSpPr>
+          <a:xfrm>
+            <a:off x="72008" y="63449"/>
+            <a:ext cx="6084168" cy="8181529"/>
+            <a:chOff x="0" y="-1"/>
+            <a:chExt cx="6084168" cy="8181529"/>
+          </a:xfrm>
+        </p:grpSpPr>
+        <p:sp>
+          <p:nvSpPr>
+            <p:cNvPr id="15" name="TextBox 14"/>
+            <p:cNvSpPr txBox="1"/>
+            <p:nvPr/>
+          </p:nvSpPr>
+          <p:spPr>
+            <a:xfrm>
+              <a:off x="0" y="1"/>
+              <a:ext cx="295274" cy="276999"/>
+            </a:xfrm>
+            <a:prstGeom prst="rect">
+              <a:avLst/>
+            </a:prstGeom>
+            <a:noFill/>
+          </p:spPr>
+          <p:txBody>
+            <a:bodyPr wrap="none" rtlCol="0">
+              <a:spAutoFit/>
+            </a:bodyPr>
+            <a:lstStyle/>
+            <a:p>
+              <a:r>
+                <a:rPr lang="en-AU" sz="1200" b="1" dirty="0" smtClean="0">
+                  <a:latin typeface="Arial" panose="020B0604020202020204" pitchFamily="34" charset="0"/>
+                  <a:cs typeface="Arial" panose="020B0604020202020204" pitchFamily="34" charset="0"/>
+                </a:rPr>
+                <a:t>A</a:t>
+              </a:r>
+              <a:endParaRPr lang="en-AU" sz="1200" b="1" dirty="0">
+                <a:latin typeface="Arial" panose="020B0604020202020204" pitchFamily="34" charset="0"/>
+                <a:cs typeface="Arial" panose="020B0604020202020204" pitchFamily="34" charset="0"/>
+              </a:endParaRPr>
+            </a:p>
+          </p:txBody>
+        </p:sp>
+        <p:sp>
+          <p:nvSpPr>
+            <p:cNvPr id="16" name="TextBox 15"/>
+            <p:cNvSpPr txBox="1"/>
+            <p:nvPr/>
+          </p:nvSpPr>
+          <p:spPr>
+            <a:xfrm>
+              <a:off x="3060000" y="-1"/>
+              <a:ext cx="295274" cy="276999"/>
+            </a:xfrm>
+            <a:prstGeom prst="rect">
+              <a:avLst/>
+            </a:prstGeom>
+            <a:noFill/>
+          </p:spPr>
+          <p:txBody>
+            <a:bodyPr wrap="none" rtlCol="0">
+              <a:spAutoFit/>
+            </a:bodyPr>
+            <a:lstStyle/>
+            <a:p>
+              <a:r>
+                <a:rPr lang="en-AU" sz="1200" b="1" dirty="0">
+                  <a:latin typeface="Arial" panose="020B0604020202020204" pitchFamily="34" charset="0"/>
+                  <a:cs typeface="Arial" panose="020B0604020202020204" pitchFamily="34" charset="0"/>
+                </a:rPr>
+                <a:t>B</a:t>
+              </a:r>
+            </a:p>
+          </p:txBody>
+        </p:sp>
+        <p:sp>
+          <p:nvSpPr>
+            <p:cNvPr id="17" name="TextBox 16"/>
+            <p:cNvSpPr txBox="1"/>
+            <p:nvPr/>
+          </p:nvSpPr>
+          <p:spPr>
+            <a:xfrm>
+              <a:off x="0" y="4140000"/>
+              <a:ext cx="295274" cy="276999"/>
+            </a:xfrm>
+            <a:prstGeom prst="rect">
+              <a:avLst/>
+            </a:prstGeom>
+            <a:noFill/>
+          </p:spPr>
+          <p:txBody>
+            <a:bodyPr wrap="none" rtlCol="0">
+              <a:spAutoFit/>
+            </a:bodyPr>
+            <a:lstStyle/>
+            <a:p>
+              <a:r>
+                <a:rPr lang="en-AU" sz="1200" b="1" dirty="0">
+                  <a:latin typeface="Arial" panose="020B0604020202020204" pitchFamily="34" charset="0"/>
+                  <a:cs typeface="Arial" panose="020B0604020202020204" pitchFamily="34" charset="0"/>
+                </a:rPr>
+                <a:t>C</a:t>
+              </a:r>
+            </a:p>
+          </p:txBody>
+        </p:sp>
+        <p:sp>
+          <p:nvSpPr>
+            <p:cNvPr id="18" name="TextBox 17"/>
+            <p:cNvSpPr txBox="1"/>
+            <p:nvPr/>
+          </p:nvSpPr>
+          <p:spPr>
+            <a:xfrm>
+              <a:off x="3060000" y="4140000"/>
+              <a:ext cx="295274" cy="276999"/>
+            </a:xfrm>
+            <a:prstGeom prst="rect">
+              <a:avLst/>
+            </a:prstGeom>
+            <a:noFill/>
+          </p:spPr>
+          <p:txBody>
+            <a:bodyPr wrap="none" rtlCol="0">
+              <a:spAutoFit/>
+            </a:bodyPr>
+            <a:lstStyle/>
+            <a:p>
+              <a:r>
+                <a:rPr lang="en-AU" sz="1200" b="1" dirty="0">
+                  <a:latin typeface="Arial" panose="020B0604020202020204" pitchFamily="34" charset="0"/>
+                  <a:cs typeface="Arial" panose="020B0604020202020204" pitchFamily="34" charset="0"/>
+                </a:rPr>
+                <a:t>D</a:t>
+              </a:r>
+            </a:p>
+          </p:txBody>
+        </p:sp>
+        <p:pic>
+          <p:nvPicPr>
+            <p:cNvPr id="19" name="Picture 2"/>
+            <p:cNvPicPr>
+              <a:picLocks noChangeAspect="1" noChangeArrowheads="1"/>
+            </p:cNvPicPr>
+            <p:nvPr/>
+          </p:nvPicPr>
+          <p:blipFill rotWithShape="1">
+            <a:blip r:embed="rId2" cstate="print">
+              <a:extLst>
+                <a:ext uri="{28A0092B-C50C-407E-A947-70E740481C1C}">
+                  <a14:useLocalDpi xmlns="" xmlns:a14="http://schemas.microsoft.com/office/drawing/2010/main" val="0"/>
+                </a:ext>
+              </a:extLst>
+            </a:blip>
+            <a:srcRect l="1969" t="4362" r="1958" b="3787"/>
+            <a:stretch/>
+          </p:blipFill>
+          <p:spPr bwMode="auto">
+            <a:xfrm>
+              <a:off x="3114168" y="279072"/>
+              <a:ext cx="2970000" cy="3798000"/>
+            </a:xfrm>
+            <a:prstGeom prst="rect">
+              <a:avLst/>
+            </a:prstGeom>
+            <a:noFill/>
+            <a:ln>
+              <a:noFill/>
+            </a:ln>
+            <a:extLst>
+              <a:ext uri="{909E8E84-426E-40DD-AFC4-6F175D3DCCD1}">
+                <a14:hiddenFill xmlns="" xmlns:a14="http://schemas.microsoft.com/office/drawing/2010/main">
+                  <a:solidFill>
+                    <a:schemeClr val="accent1"/>
+                  </a:solidFill>
+                </a14:hiddenFill>
+              </a:ext>
+              <a:ext uri="{91240B29-F687-4F45-9708-019B960494DF}">
+                <a14:hiddenLine xmlns="" xmlns:a14="http://schemas.microsoft.com/office/drawing/2010/main" w="9525">
+                  <a:solidFill>
+                    <a:schemeClr val="tx1"/>
+                  </a:solidFill>
+                  <a:miter lim="800000"/>
+                  <a:headEnd/>
+                  <a:tailEnd/>
+                </a14:hiddenLine>
+              </a:ext>
+            </a:extLst>
+          </p:spPr>
+        </p:pic>
+        <p:pic>
+          <p:nvPicPr>
+            <p:cNvPr id="20" name="Picture 4"/>
+            <p:cNvPicPr>
+              <a:picLocks noChangeAspect="1" noChangeArrowheads="1"/>
+            </p:cNvPicPr>
+            <p:nvPr/>
+          </p:nvPicPr>
+          <p:blipFill rotWithShape="1">
+            <a:blip r:embed="rId3" cstate="print">
+              <a:extLst>
+                <a:ext uri="{28A0092B-C50C-407E-A947-70E740481C1C}">
+                  <a14:useLocalDpi xmlns="" xmlns:a14="http://schemas.microsoft.com/office/drawing/2010/main" val="0"/>
+                </a:ext>
+              </a:extLst>
+            </a:blip>
+            <a:srcRect l="1639" t="3410" r="4642" b="4175"/>
+            <a:stretch/>
+          </p:blipFill>
+          <p:spPr bwMode="auto">
+            <a:xfrm>
+              <a:off x="107504" y="4384800"/>
+              <a:ext cx="2880000" cy="3780000"/>
+            </a:xfrm>
+            <a:prstGeom prst="rect">
+              <a:avLst/>
+            </a:prstGeom>
+            <a:noFill/>
+            <a:ln>
+              <a:noFill/>
+            </a:ln>
+            <a:extLst>
+              <a:ext uri="{909E8E84-426E-40DD-AFC4-6F175D3DCCD1}">
+                <a14:hiddenFill xmlns="" xmlns:a14="http://schemas.microsoft.com/office/drawing/2010/main">
+                  <a:solidFill>
+                    <a:schemeClr val="accent1"/>
+                  </a:solidFill>
+                </a14:hiddenFill>
+              </a:ext>
+              <a:ext uri="{91240B29-F687-4F45-9708-019B960494DF}">
+                <a14:hiddenLine xmlns="" xmlns:a14="http://schemas.microsoft.com/office/drawing/2010/main" w="9525">
+                  <a:solidFill>
+                    <a:schemeClr val="tx1"/>
+                  </a:solidFill>
+                  <a:miter lim="800000"/>
+                  <a:headEnd/>
+                  <a:tailEnd/>
+                </a14:hiddenLine>
+              </a:ext>
+            </a:extLst>
+          </p:spPr>
+        </p:pic>
+        <p:pic>
+          <p:nvPicPr>
+            <p:cNvPr id="21" name="Picture 5"/>
+            <p:cNvPicPr>
+              <a:picLocks noChangeAspect="1" noChangeArrowheads="1"/>
+            </p:cNvPicPr>
+            <p:nvPr/>
+          </p:nvPicPr>
+          <p:blipFill rotWithShape="1">
+            <a:blip r:embed="rId4" cstate="print">
+              <a:extLst>
+                <a:ext uri="{28A0092B-C50C-407E-A947-70E740481C1C}">
+                  <a14:useLocalDpi xmlns="" xmlns:a14="http://schemas.microsoft.com/office/drawing/2010/main" val="0"/>
+                </a:ext>
+              </a:extLst>
+            </a:blip>
+            <a:srcRect l="2176" t="3785" r="2226" b="4100"/>
+            <a:stretch/>
+          </p:blipFill>
+          <p:spPr bwMode="auto">
+            <a:xfrm>
+              <a:off x="35497" y="279072"/>
+              <a:ext cx="2957549" cy="3798000"/>
+            </a:xfrm>
+            <a:prstGeom prst="rect">
+              <a:avLst/>
+            </a:prstGeom>
+            <a:noFill/>
+            <a:ln>
+              <a:noFill/>
+            </a:ln>
+            <a:extLst>
+              <a:ext uri="{909E8E84-426E-40DD-AFC4-6F175D3DCCD1}">
+                <a14:hiddenFill xmlns="" xmlns:a14="http://schemas.microsoft.com/office/drawing/2010/main">
+                  <a:solidFill>
+                    <a:schemeClr val="accent1"/>
+                  </a:solidFill>
+                </a14:hiddenFill>
+              </a:ext>
+              <a:ext uri="{91240B29-F687-4F45-9708-019B960494DF}">
+                <a14:hiddenLine xmlns="" xmlns:a14="http://schemas.microsoft.com/office/drawing/2010/main" w="9525">
+                  <a:solidFill>
+                    <a:schemeClr val="tx1"/>
+                  </a:solidFill>
+                  <a:miter lim="800000"/>
+                  <a:headEnd/>
+                  <a:tailEnd/>
+                </a14:hiddenLine>
+              </a:ext>
+            </a:extLst>
+          </p:spPr>
+        </p:pic>
+        <p:pic>
+          <p:nvPicPr>
+            <p:cNvPr id="22" name="Picture 2"/>
+            <p:cNvPicPr>
+              <a:picLocks noChangeAspect="1" noChangeArrowheads="1"/>
+            </p:cNvPicPr>
+            <p:nvPr/>
+          </p:nvPicPr>
+          <p:blipFill rotWithShape="1">
+            <a:blip r:embed="rId5" cstate="print">
+              <a:extLst>
+                <a:ext uri="{28A0092B-C50C-407E-A947-70E740481C1C}">
+                  <a14:useLocalDpi xmlns="" xmlns:a14="http://schemas.microsoft.com/office/drawing/2010/main" val="0"/>
+                </a:ext>
+              </a:extLst>
+            </a:blip>
+            <a:srcRect l="2625" t="3804" r="2593" b="4238"/>
+            <a:stretch/>
+          </p:blipFill>
+          <p:spPr bwMode="auto">
+            <a:xfrm>
+              <a:off x="3132168" y="4383528"/>
+              <a:ext cx="2952000" cy="3798000"/>
+            </a:xfrm>
+            <a:prstGeom prst="rect">
+              <a:avLst/>
+            </a:prstGeom>
+            <a:noFill/>
+            <a:ln>
+              <a:noFill/>
+            </a:ln>
+            <a:extLst>
+              <a:ext uri="{909E8E84-426E-40DD-AFC4-6F175D3DCCD1}">
+                <a14:hiddenFill xmlns="" xmlns:a14="http://schemas.microsoft.com/office/drawing/2010/main">
+                  <a:solidFill>
+                    <a:schemeClr val="accent1"/>
+                  </a:solidFill>
+                </a14:hiddenFill>
+              </a:ext>
+              <a:ext uri="{91240B29-F687-4F45-9708-019B960494DF}">
+                <a14:hiddenLine xmlns="" xmlns:a14="http://schemas.microsoft.com/office/drawing/2010/main" w="9525">
+                  <a:solidFill>
+                    <a:schemeClr val="tx1"/>
+                  </a:solidFill>
+                  <a:miter lim="800000"/>
+                  <a:headEnd/>
+                  <a:tailEnd/>
+                </a14:hiddenLine>
+              </a:ext>
+            </a:extLst>
+          </p:spPr>
+        </p:pic>
+      </p:grpSp>
+    </p:spTree>
+    <p:extLst>
+      <p:ext uri="{BB962C8B-B14F-4D97-AF65-F5344CB8AC3E}">
+        <p14:creationId xmlns="" xmlns:p14="http://schemas.microsoft.com/office/powerpoint/2010/main" val="3227314395"/>
+      </p:ext>
+    </p:extLst>
+  </p:cSld>
+  <p:clrMapOvr>
+    <a:masterClrMapping/>
+  </p:clrMapOvr>
+</p:sld>
+</file>
+
+<file path=ppt/slides/slide4.xml><?xml version="1.0" encoding="utf-8"?>
+<p:sld xmlns:a="http://schemas.openxmlformats.org/drawingml/2006/main" xmlns:r="http://schemas.openxmlformats.org/officeDocument/2006/relationships" xmlns:p="http://schemas.openxmlformats.org/presentationml/2006/main">
+  <p:cSld>
+    <p:spTree>
+      <p:nvGrpSpPr>
+        <p:cNvPr id="1" name=""/>
+        <p:cNvGrpSpPr/>
+        <p:nvPr/>
+      </p:nvGrpSpPr>
+      <p:grpSpPr>
+        <a:xfrm>
+          <a:off x="0" y="0"/>
+          <a:ext cx="0" cy="0"/>
+          <a:chOff x="0" y="0"/>
+          <a:chExt cx="0" cy="0"/>
+        </a:xfrm>
+      </p:grpSpPr>
+      <p:grpSp>
+        <p:nvGrpSpPr>
+          <p:cNvPr id="14" name="Group 13"/>
+          <p:cNvGrpSpPr/>
+          <p:nvPr/>
+        </p:nvGrpSpPr>
+        <p:grpSpPr>
+          <a:xfrm>
+            <a:off x="2555776" y="1692250"/>
+            <a:ext cx="3173573" cy="3798000"/>
+            <a:chOff x="2555776" y="1692250"/>
+            <a:chExt cx="3173573" cy="3798000"/>
+          </a:xfrm>
+        </p:grpSpPr>
+        <p:grpSp>
+          <p:nvGrpSpPr>
+            <p:cNvPr id="4" name="Group 3"/>
+            <p:cNvGrpSpPr/>
+            <p:nvPr/>
+          </p:nvGrpSpPr>
+          <p:grpSpPr>
+            <a:xfrm>
+              <a:off x="2555776" y="1775291"/>
+              <a:ext cx="295274" cy="2930262"/>
+              <a:chOff x="35496" y="349801"/>
+              <a:chExt cx="295274" cy="2232582"/>
+            </a:xfrm>
+          </p:grpSpPr>
+          <p:sp>
+            <p:nvSpPr>
+              <p:cNvPr id="6" name="TextBox 5"/>
+              <p:cNvSpPr txBox="1"/>
+              <p:nvPr/>
+            </p:nvSpPr>
+            <p:spPr>
+              <a:xfrm>
+                <a:off x="35496" y="349801"/>
+                <a:ext cx="295274" cy="211047"/>
+              </a:xfrm>
+              <a:prstGeom prst="rect">
+                <a:avLst/>
+              </a:prstGeom>
+              <a:noFill/>
+            </p:spPr>
+            <p:txBody>
+              <a:bodyPr wrap="none" rtlCol="0">
+                <a:spAutoFit/>
+              </a:bodyPr>
+              <a:lstStyle/>
+              <a:p>
+                <a:r>
+                  <a:rPr lang="en-AU" sz="1200" b="1" dirty="0" smtClean="0">
+                    <a:latin typeface="Arial" panose="020B0604020202020204" pitchFamily="34" charset="0"/>
+                    <a:cs typeface="Arial" panose="020B0604020202020204" pitchFamily="34" charset="0"/>
+                  </a:rPr>
+                  <a:t>A</a:t>
+                </a:r>
+                <a:endParaRPr lang="en-AU" sz="1200" b="1" dirty="0">
+                  <a:latin typeface="Arial" panose="020B0604020202020204" pitchFamily="34" charset="0"/>
+                  <a:cs typeface="Arial" panose="020B0604020202020204" pitchFamily="34" charset="0"/>
+                </a:endParaRPr>
+              </a:p>
+            </p:txBody>
+          </p:sp>
+          <p:sp>
+            <p:nvSpPr>
+              <p:cNvPr id="7" name="TextBox 6"/>
+              <p:cNvSpPr txBox="1"/>
+              <p:nvPr/>
+            </p:nvSpPr>
+            <p:spPr>
+              <a:xfrm>
+                <a:off x="35496" y="788707"/>
+                <a:ext cx="295274" cy="211047"/>
+              </a:xfrm>
+              <a:prstGeom prst="rect">
+                <a:avLst/>
+              </a:prstGeom>
+              <a:noFill/>
+            </p:spPr>
+            <p:txBody>
+              <a:bodyPr wrap="none" rtlCol="0">
+                <a:spAutoFit/>
+              </a:bodyPr>
+              <a:lstStyle/>
+              <a:p>
+                <a:r>
+                  <a:rPr lang="en-AU" sz="1200" b="1" dirty="0">
+                    <a:latin typeface="Arial" panose="020B0604020202020204" pitchFamily="34" charset="0"/>
+                    <a:cs typeface="Arial" panose="020B0604020202020204" pitchFamily="34" charset="0"/>
+                  </a:rPr>
+                  <a:t>B</a:t>
+                </a:r>
+              </a:p>
+            </p:txBody>
+          </p:sp>
+          <p:sp>
+            <p:nvSpPr>
+              <p:cNvPr id="8" name="TextBox 7"/>
+              <p:cNvSpPr txBox="1"/>
+              <p:nvPr/>
+            </p:nvSpPr>
+            <p:spPr>
+              <a:xfrm>
+                <a:off x="35496" y="1383796"/>
+                <a:ext cx="295274" cy="211047"/>
+              </a:xfrm>
+              <a:prstGeom prst="rect">
+                <a:avLst/>
+              </a:prstGeom>
+              <a:noFill/>
+            </p:spPr>
+            <p:txBody>
+              <a:bodyPr wrap="none" rtlCol="0">
+                <a:spAutoFit/>
+              </a:bodyPr>
+              <a:lstStyle/>
+              <a:p>
+                <a:r>
+                  <a:rPr lang="en-AU" sz="1200" b="1" dirty="0">
+                    <a:latin typeface="Arial" panose="020B0604020202020204" pitchFamily="34" charset="0"/>
+                    <a:cs typeface="Arial" panose="020B0604020202020204" pitchFamily="34" charset="0"/>
+                  </a:rPr>
+                  <a:t>C</a:t>
+                </a:r>
+              </a:p>
+            </p:txBody>
+          </p:sp>
+          <p:sp>
+            <p:nvSpPr>
+              <p:cNvPr id="9" name="TextBox 8"/>
+              <p:cNvSpPr txBox="1"/>
+              <p:nvPr/>
+            </p:nvSpPr>
+            <p:spPr>
+              <a:xfrm>
+                <a:off x="35496" y="1877566"/>
+                <a:ext cx="295274" cy="211047"/>
+              </a:xfrm>
+              <a:prstGeom prst="rect">
+                <a:avLst/>
+              </a:prstGeom>
+              <a:noFill/>
+            </p:spPr>
+            <p:txBody>
+              <a:bodyPr wrap="none" rtlCol="0">
+                <a:spAutoFit/>
+              </a:bodyPr>
+              <a:lstStyle/>
+              <a:p>
+                <a:r>
+                  <a:rPr lang="en-AU" sz="1200" b="1" dirty="0">
+                    <a:latin typeface="Arial" panose="020B0604020202020204" pitchFamily="34" charset="0"/>
+                    <a:cs typeface="Arial" panose="020B0604020202020204" pitchFamily="34" charset="0"/>
+                  </a:rPr>
+                  <a:t>D</a:t>
+                </a:r>
+              </a:p>
+            </p:txBody>
+          </p:sp>
+          <p:sp>
+            <p:nvSpPr>
+              <p:cNvPr id="10" name="TextBox 9"/>
+              <p:cNvSpPr txBox="1"/>
+              <p:nvPr/>
+            </p:nvSpPr>
+            <p:spPr>
+              <a:xfrm>
+                <a:off x="35496" y="2371336"/>
+                <a:ext cx="287258" cy="211047"/>
+              </a:xfrm>
+              <a:prstGeom prst="rect">
+                <a:avLst/>
+              </a:prstGeom>
+              <a:noFill/>
+            </p:spPr>
+            <p:txBody>
+              <a:bodyPr wrap="none" rtlCol="0">
+                <a:spAutoFit/>
+              </a:bodyPr>
+              <a:lstStyle/>
+              <a:p>
+                <a:r>
+                  <a:rPr lang="en-AU" sz="1200" b="1" dirty="0">
+                    <a:latin typeface="Arial" panose="020B0604020202020204" pitchFamily="34" charset="0"/>
+                    <a:cs typeface="Arial" panose="020B0604020202020204" pitchFamily="34" charset="0"/>
+                  </a:rPr>
+                  <a:t>E</a:t>
+                </a:r>
+              </a:p>
+            </p:txBody>
+          </p:sp>
+        </p:grpSp>
+        <p:pic>
+          <p:nvPicPr>
+            <p:cNvPr id="13" name="Picture 5"/>
+            <p:cNvPicPr>
+              <a:picLocks noChangeAspect="1" noChangeArrowheads="1"/>
+            </p:cNvPicPr>
+            <p:nvPr/>
+          </p:nvPicPr>
+          <p:blipFill rotWithShape="1">
+            <a:blip r:embed="rId2" cstate="print">
+              <a:extLst>
+                <a:ext uri="{28A0092B-C50C-407E-A947-70E740481C1C}">
+                  <a14:useLocalDpi xmlns="" xmlns:a14="http://schemas.microsoft.com/office/drawing/2010/main" val="0"/>
+                </a:ext>
+              </a:extLst>
+            </a:blip>
+            <a:srcRect l="2176" t="3785" r="2226" b="4100"/>
+            <a:stretch/>
+          </p:blipFill>
+          <p:spPr bwMode="auto">
+            <a:xfrm>
+              <a:off x="2771800" y="1692250"/>
+              <a:ext cx="2957549" cy="3798000"/>
+            </a:xfrm>
+            <a:prstGeom prst="rect">
+              <a:avLst/>
+            </a:prstGeom>
+            <a:noFill/>
+            <a:ln>
+              <a:noFill/>
+            </a:ln>
+            <a:extLst>
+              <a:ext uri="{909E8E84-426E-40DD-AFC4-6F175D3DCCD1}">
+                <a14:hiddenFill xmlns="" xmlns:a14="http://schemas.microsoft.com/office/drawing/2010/main">
+                  <a:solidFill>
+                    <a:schemeClr val="accent1"/>
+                  </a:solidFill>
+                </a14:hiddenFill>
+              </a:ext>
+              <a:ext uri="{91240B29-F687-4F45-9708-019B960494DF}">
+                <a14:hiddenLine xmlns="" xmlns:a14="http://schemas.microsoft.com/office/drawing/2010/main" w="9525">
+                  <a:solidFill>
+                    <a:schemeClr val="tx1"/>
+                  </a:solidFill>
+                  <a:miter lim="800000"/>
+                  <a:headEnd/>
+                  <a:tailEnd/>
+                </a14:hiddenLine>
+              </a:ext>
+            </a:extLst>
+          </p:spPr>
+        </p:pic>
+      </p:grpSp>
+    </p:spTree>
+  </p:cSld>
+  <p:clrMapOvr>
+    <a:masterClrMapping/>
+  </p:clrMapOvr>
+</p:sld>
+</file>
+
+<file path=ppt/slides/slide5.xml><?xml version="1.0" encoding="utf-8"?>
+<p:sld xmlns:a="http://schemas.openxmlformats.org/drawingml/2006/main" xmlns:r="http://schemas.openxmlformats.org/officeDocument/2006/relationships" xmlns:p="http://schemas.openxmlformats.org/presentationml/2006/main">
+  <p:cSld>
+    <p:spTree>
+      <p:nvGrpSpPr>
+        <p:cNvPr id="1" name=""/>
+        <p:cNvGrpSpPr/>
+        <p:nvPr/>
+      </p:nvGrpSpPr>
+      <p:grpSpPr>
+        <a:xfrm>
+          <a:off x="0" y="0"/>
+          <a:ext cx="0" cy="0"/>
+          <a:chOff x="0" y="0"/>
+          <a:chExt cx="0" cy="0"/>
+        </a:xfrm>
+      </p:grpSpPr>
+      <p:sp>
+        <p:nvSpPr>
+          <p:cNvPr id="8" name="Rectangle 7"/>
+          <p:cNvSpPr/>
+          <p:nvPr/>
+        </p:nvSpPr>
+        <p:spPr>
+          <a:xfrm>
+            <a:off x="1260000" y="396106"/>
+            <a:ext cx="432048" cy="288032"/>
+          </a:xfrm>
+          <a:prstGeom prst="rect">
+            <a:avLst/>
+          </a:prstGeom>
+          <a:noFill/>
+          <a:ln w="6350">
+            <a:solidFill>
+              <a:schemeClr val="tx1"/>
+            </a:solidFill>
+          </a:ln>
+        </p:spPr>
+        <p:style>
+          <a:lnRef idx="2">
+            <a:schemeClr val="accent1">
+              <a:shade val="50000"/>
+            </a:schemeClr>
+          </a:lnRef>
+          <a:fillRef idx="1">
+            <a:schemeClr val="accent1"/>
+          </a:fillRef>
+          <a:effectRef idx="0">
+            <a:schemeClr val="accent1"/>
+          </a:effectRef>
+          <a:fontRef idx="minor">
+            <a:schemeClr val="lt1"/>
+          </a:fontRef>
+        </p:style>
+        <p:txBody>
+          <a:bodyPr rtlCol="0" anchor="ctr"/>
+          <a:lstStyle/>
+          <a:p>
+            <a:pPr algn="ctr"/>
+            <a:r>
+              <a:rPr lang="en-AU" sz="800" dirty="0" smtClean="0">
+                <a:latin typeface="Arial" pitchFamily="34" charset="0"/>
+                <a:cs typeface="Arial" pitchFamily="34" charset="0"/>
+              </a:rPr>
+              <a:t>F(x)</a:t>
+            </a:r>
+            <a:endParaRPr lang="en-AU" sz="800" dirty="0">
+              <a:latin typeface="Arial" pitchFamily="34" charset="0"/>
+              <a:cs typeface="Arial" pitchFamily="34" charset="0"/>
+            </a:endParaRPr>
+          </a:p>
+        </p:txBody>
+      </p:sp>
+      <p:sp>
+        <p:nvSpPr>
+          <p:cNvPr id="4" name="Rectangle 3"/>
+          <p:cNvSpPr/>
+          <p:nvPr/>
+        </p:nvSpPr>
+        <p:spPr>
+          <a:xfrm>
+            <a:off x="0" y="0"/>
+            <a:ext cx="2952000" cy="2556346"/>
+          </a:xfrm>
+          <a:prstGeom prst="rect">
+            <a:avLst/>
+          </a:prstGeom>
+          <a:noFill/>
+          <a:ln w="6350"/>
+        </p:spPr>
+        <p:style>
+          <a:lnRef idx="2">
+            <a:schemeClr val="accent1">
+              <a:shade val="50000"/>
+            </a:schemeClr>
+          </a:lnRef>
+          <a:fillRef idx="1">
+            <a:schemeClr val="accent1"/>
+          </a:fillRef>
+          <a:effectRef idx="0">
+            <a:schemeClr val="accent1"/>
+          </a:effectRef>
+          <a:fontRef idx="minor">
+            <a:schemeClr val="lt1"/>
+          </a:fontRef>
+        </p:style>
+        <p:txBody>
+          <a:bodyPr rtlCol="0" anchor="ctr"/>
+          <a:lstStyle/>
+          <a:p>
+            <a:pPr algn="ctr"/>
+            <a:endParaRPr lang="en-AU" dirty="0"/>
+          </a:p>
+        </p:txBody>
+      </p:sp>
+      <p:pic>
+        <p:nvPicPr>
+          <p:cNvPr id="1027" name="Picture 3"/>
+          <p:cNvPicPr>
+            <a:picLocks noChangeAspect="1" noChangeArrowheads="1"/>
+          </p:cNvPicPr>
+          <p:nvPr/>
+        </p:nvPicPr>
+        <p:blipFill>
+          <a:blip r:embed="rId2" cstate="print"/>
+          <a:srcRect l="14987" t="16322" r="14050" b="19224"/>
+          <a:stretch>
+            <a:fillRect/>
+          </a:stretch>
+        </p:blipFill>
+        <p:spPr bwMode="auto">
+          <a:xfrm>
+            <a:off x="18000" y="18000"/>
+            <a:ext cx="894095" cy="1048554"/>
+          </a:xfrm>
+          <a:prstGeom prst="rect">
+            <a:avLst/>
+          </a:prstGeom>
+          <a:noFill/>
+          <a:ln w="9525">
+            <a:noFill/>
+            <a:miter lim="800000"/>
+            <a:headEnd/>
+            <a:tailEnd/>
+          </a:ln>
+        </p:spPr>
+      </p:pic>
+      <p:pic>
+        <p:nvPicPr>
+          <p:cNvPr id="1028" name="Picture 4"/>
+          <p:cNvPicPr>
+            <a:picLocks noChangeAspect="1" noChangeArrowheads="1"/>
+          </p:cNvPicPr>
+          <p:nvPr/>
+        </p:nvPicPr>
+        <p:blipFill>
+          <a:blip r:embed="rId3" cstate="print"/>
+          <a:srcRect l="11622" t="20675" r="9763" b="22489"/>
+          <a:stretch>
+            <a:fillRect/>
+          </a:stretch>
+        </p:blipFill>
+        <p:spPr bwMode="auto">
+          <a:xfrm>
+            <a:off x="1944000" y="100800"/>
+            <a:ext cx="990550" cy="917847"/>
+          </a:xfrm>
+          <a:prstGeom prst="rect">
+            <a:avLst/>
+          </a:prstGeom>
+          <a:noFill/>
+          <a:ln w="9525">
+            <a:noFill/>
+            <a:miter lim="800000"/>
+            <a:headEnd/>
+            <a:tailEnd/>
+          </a:ln>
+        </p:spPr>
+      </p:pic>
+      <p:sp>
+        <p:nvSpPr>
+          <p:cNvPr id="9" name="TextBox 8"/>
+          <p:cNvSpPr txBox="1"/>
+          <p:nvPr/>
+        </p:nvSpPr>
+        <p:spPr>
+          <a:xfrm>
+            <a:off x="1267200" y="417600"/>
+            <a:ext cx="370614" cy="246221"/>
+          </a:xfrm>
+          <a:prstGeom prst="rect">
+            <a:avLst/>
+          </a:prstGeom>
+          <a:noFill/>
+        </p:spPr>
+        <p:txBody>
+          <a:bodyPr wrap="none" rtlCol="0">
+            <a:spAutoFit/>
+          </a:bodyPr>
+          <a:lstStyle/>
+          <a:p>
+            <a:r>
+              <a:rPr lang="en-AU" sz="1000" dirty="0" smtClean="0">
+                <a:latin typeface="Arial" pitchFamily="34" charset="0"/>
+                <a:cs typeface="Arial" pitchFamily="34" charset="0"/>
+              </a:rPr>
+              <a:t>f</a:t>
+            </a:r>
+            <a:r>
+              <a:rPr lang="en-AU" sz="1000" dirty="0" smtClean="0">
+                <a:latin typeface="Arial" pitchFamily="34" charset="0"/>
+                <a:cs typeface="Arial" pitchFamily="34" charset="0"/>
+              </a:rPr>
+              <a:t>(x)</a:t>
+            </a:r>
+            <a:endParaRPr lang="en-AU" sz="1000" dirty="0">
+              <a:latin typeface="Arial" pitchFamily="34" charset="0"/>
+              <a:cs typeface="Arial" pitchFamily="34" charset="0"/>
+            </a:endParaRPr>
+          </a:p>
+        </p:txBody>
+      </p:sp>
+      <p:cxnSp>
+        <p:nvCxnSpPr>
+          <p:cNvPr id="11" name="Straight Arrow Connector 10"/>
+          <p:cNvCxnSpPr>
+            <a:endCxn id="8" idx="1"/>
+          </p:cNvCxnSpPr>
+          <p:nvPr/>
+        </p:nvCxnSpPr>
+        <p:spPr>
+          <a:xfrm>
+            <a:off x="971600" y="540122"/>
+            <a:ext cx="288400" cy="0"/>
+          </a:xfrm>
+          <a:prstGeom prst="straightConnector1">
+            <a:avLst/>
+          </a:prstGeom>
+          <a:ln>
+            <a:solidFill>
+              <a:schemeClr val="tx1"/>
+            </a:solidFill>
+            <a:tailEnd type="arrow"/>
+          </a:ln>
+        </p:spPr>
+        <p:style>
+          <a:lnRef idx="1">
+            <a:schemeClr val="accent1"/>
+          </a:lnRef>
+          <a:fillRef idx="0">
+            <a:schemeClr val="accent1"/>
+          </a:fillRef>
+          <a:effectRef idx="0">
+            <a:schemeClr val="accent1"/>
+          </a:effectRef>
+          <a:fontRef idx="minor">
+            <a:schemeClr val="tx1"/>
+          </a:fontRef>
+        </p:style>
+      </p:cxnSp>
+      <p:cxnSp>
+        <p:nvCxnSpPr>
+          <p:cNvPr id="12" name="Straight Arrow Connector 11"/>
+          <p:cNvCxnSpPr/>
+          <p:nvPr/>
+        </p:nvCxnSpPr>
+        <p:spPr>
+          <a:xfrm>
+            <a:off x="1691680" y="540122"/>
+            <a:ext cx="288400" cy="0"/>
+          </a:xfrm>
+          <a:prstGeom prst="straightConnector1">
+            <a:avLst/>
+          </a:prstGeom>
+          <a:ln>
+            <a:solidFill>
+              <a:schemeClr val="tx1"/>
+            </a:solidFill>
+            <a:tailEnd type="arrow"/>
+          </a:ln>
+        </p:spPr>
+        <p:style>
+          <a:lnRef idx="1">
+            <a:schemeClr val="accent1"/>
+          </a:lnRef>
+          <a:fillRef idx="0">
+            <a:schemeClr val="accent1"/>
+          </a:fillRef>
+          <a:effectRef idx="0">
+            <a:schemeClr val="accent1"/>
+          </a:effectRef>
+          <a:fontRef idx="minor">
+            <a:schemeClr val="tx1"/>
+          </a:fontRef>
+        </p:style>
+      </p:cxnSp>
+      <p:pic>
+        <p:nvPicPr>
+          <p:cNvPr id="1029" name="Picture 5"/>
+          <p:cNvPicPr>
+            <a:picLocks noChangeAspect="1" noChangeArrowheads="1"/>
+          </p:cNvPicPr>
+          <p:nvPr/>
+        </p:nvPicPr>
+        <p:blipFill>
+          <a:blip r:embed="rId4" cstate="print"/>
+          <a:srcRect/>
+          <a:stretch>
+            <a:fillRect/>
+          </a:stretch>
+        </p:blipFill>
+        <p:spPr bwMode="auto">
+          <a:xfrm>
+            <a:off x="251520" y="1044178"/>
+            <a:ext cx="2520000" cy="1443958"/>
+          </a:xfrm>
+          <a:prstGeom prst="rect">
+            <a:avLst/>
+          </a:prstGeom>
+          <a:noFill/>
+          <a:ln w="9525">
+            <a:noFill/>
+            <a:miter lim="800000"/>
+            <a:headEnd/>
+            <a:tailEnd/>
+          </a:ln>
+        </p:spPr>
+      </p:pic>
+      <p:sp>
+        <p:nvSpPr>
+          <p:cNvPr id="14" name="TextBox 13"/>
+          <p:cNvSpPr txBox="1"/>
+          <p:nvPr/>
+        </p:nvSpPr>
+        <p:spPr>
+          <a:xfrm>
+            <a:off x="0" y="0"/>
+            <a:ext cx="295274" cy="276999"/>
+          </a:xfrm>
+          <a:prstGeom prst="rect">
+            <a:avLst/>
+          </a:prstGeom>
+          <a:noFill/>
+        </p:spPr>
+        <p:txBody>
+          <a:bodyPr wrap="none" rtlCol="0">
+            <a:spAutoFit/>
+          </a:bodyPr>
+          <a:lstStyle/>
+          <a:p>
+            <a:r>
+              <a:rPr lang="en-AU" sz="1200" b="1" dirty="0" smtClean="0">
+                <a:latin typeface="Arial" pitchFamily="34" charset="0"/>
+                <a:cs typeface="Arial" pitchFamily="34" charset="0"/>
+              </a:rPr>
+              <a:t>A</a:t>
+            </a:r>
+            <a:endParaRPr lang="en-AU" sz="1200" b="1" dirty="0">
+              <a:latin typeface="Arial" pitchFamily="34" charset="0"/>
+              <a:cs typeface="Arial" pitchFamily="34" charset="0"/>
+            </a:endParaRPr>
+          </a:p>
+        </p:txBody>
+      </p:sp>
+      <p:sp>
+        <p:nvSpPr>
+          <p:cNvPr id="15" name="TextBox 14"/>
+          <p:cNvSpPr txBox="1"/>
+          <p:nvPr/>
+        </p:nvSpPr>
+        <p:spPr>
+          <a:xfrm>
+            <a:off x="0" y="1116186"/>
+            <a:ext cx="295274" cy="276999"/>
+          </a:xfrm>
+          <a:prstGeom prst="rect">
+            <a:avLst/>
+          </a:prstGeom>
+          <a:noFill/>
+        </p:spPr>
+        <p:txBody>
+          <a:bodyPr wrap="none" rtlCol="0">
+            <a:spAutoFit/>
+          </a:bodyPr>
+          <a:lstStyle/>
+          <a:p>
+            <a:r>
+              <a:rPr lang="en-AU" sz="1200" b="1" dirty="0" smtClean="0">
+                <a:latin typeface="Arial" pitchFamily="34" charset="0"/>
+                <a:cs typeface="Arial" pitchFamily="34" charset="0"/>
+              </a:rPr>
+              <a:t>B</a:t>
+            </a:r>
+            <a:endParaRPr lang="en-AU" sz="1200" b="1" dirty="0">
+              <a:latin typeface="Arial" pitchFamily="34" charset="0"/>
+              <a:cs typeface="Arial" pitchFamily="34" charset="0"/>
+            </a:endParaRPr>
+          </a:p>
+        </p:txBody>
+      </p:sp>
+    </p:spTree>
   </p:cSld>
   <p:clrMapOvr>
     <a:masterClrMapping/>

</xml_diff>

<commit_message>
Estimation for multiple animals have been initialised at same point, and results for different animals have been plotted on a single graph.
</commit_message>
<xml_diff>
--- a/fig/EstimationFigures.pptx
+++ b/fig/EstimationFigures.pptx
@@ -18,6 +18,8 @@
     <p:sldId id="267" r:id="rId12"/>
     <p:sldId id="268" r:id="rId13"/>
     <p:sldId id="269" r:id="rId14"/>
+    <p:sldId id="270" r:id="rId15"/>
+    <p:sldId id="271" r:id="rId16"/>
   </p:sldIdLst>
   <p:sldSz cx="9144000" cy="9001125"/>
   <p:notesSz cx="6858000" cy="9144000"/>
@@ -301,7 +303,7 @@
             <a:fld id="{23031417-08DC-4991-BA64-45FCA174C9D0}" type="datetimeFigureOut">
               <a:rPr lang="en-AU" smtClean="0"/>
               <a:pPr/>
-              <a:t>27/09/2013</a:t>
+              <a:t>30/09/2013</a:t>
             </a:fld>
             <a:endParaRPr lang="en-AU"/>
           </a:p>
@@ -473,7 +475,7 @@
             <a:fld id="{23031417-08DC-4991-BA64-45FCA174C9D0}" type="datetimeFigureOut">
               <a:rPr lang="en-AU" smtClean="0"/>
               <a:pPr/>
-              <a:t>27/09/2013</a:t>
+              <a:t>30/09/2013</a:t>
             </a:fld>
             <a:endParaRPr lang="en-AU"/>
           </a:p>
@@ -655,7 +657,7 @@
             <a:fld id="{23031417-08DC-4991-BA64-45FCA174C9D0}" type="datetimeFigureOut">
               <a:rPr lang="en-AU" smtClean="0"/>
               <a:pPr/>
-              <a:t>27/09/2013</a:t>
+              <a:t>30/09/2013</a:t>
             </a:fld>
             <a:endParaRPr lang="en-AU"/>
           </a:p>
@@ -827,7 +829,7 @@
             <a:fld id="{23031417-08DC-4991-BA64-45FCA174C9D0}" type="datetimeFigureOut">
               <a:rPr lang="en-AU" smtClean="0"/>
               <a:pPr/>
-              <a:t>27/09/2013</a:t>
+              <a:t>30/09/2013</a:t>
             </a:fld>
             <a:endParaRPr lang="en-AU"/>
           </a:p>
@@ -1075,7 +1077,7 @@
             <a:fld id="{23031417-08DC-4991-BA64-45FCA174C9D0}" type="datetimeFigureOut">
               <a:rPr lang="en-AU" smtClean="0"/>
               <a:pPr/>
-              <a:t>27/09/2013</a:t>
+              <a:t>30/09/2013</a:t>
             </a:fld>
             <a:endParaRPr lang="en-AU"/>
           </a:p>
@@ -1365,7 +1367,7 @@
             <a:fld id="{23031417-08DC-4991-BA64-45FCA174C9D0}" type="datetimeFigureOut">
               <a:rPr lang="en-AU" smtClean="0"/>
               <a:pPr/>
-              <a:t>27/09/2013</a:t>
+              <a:t>30/09/2013</a:t>
             </a:fld>
             <a:endParaRPr lang="en-AU"/>
           </a:p>
@@ -1789,7 +1791,7 @@
             <a:fld id="{23031417-08DC-4991-BA64-45FCA174C9D0}" type="datetimeFigureOut">
               <a:rPr lang="en-AU" smtClean="0"/>
               <a:pPr/>
-              <a:t>27/09/2013</a:t>
+              <a:t>30/09/2013</a:t>
             </a:fld>
             <a:endParaRPr lang="en-AU"/>
           </a:p>
@@ -1909,7 +1911,7 @@
             <a:fld id="{23031417-08DC-4991-BA64-45FCA174C9D0}" type="datetimeFigureOut">
               <a:rPr lang="en-AU" smtClean="0"/>
               <a:pPr/>
-              <a:t>27/09/2013</a:t>
+              <a:t>30/09/2013</a:t>
             </a:fld>
             <a:endParaRPr lang="en-AU"/>
           </a:p>
@@ -2006,7 +2008,7 @@
             <a:fld id="{23031417-08DC-4991-BA64-45FCA174C9D0}" type="datetimeFigureOut">
               <a:rPr lang="en-AU" smtClean="0"/>
               <a:pPr/>
-              <a:t>27/09/2013</a:t>
+              <a:t>30/09/2013</a:t>
             </a:fld>
             <a:endParaRPr lang="en-AU"/>
           </a:p>
@@ -2285,7 +2287,7 @@
             <a:fld id="{23031417-08DC-4991-BA64-45FCA174C9D0}" type="datetimeFigureOut">
               <a:rPr lang="en-AU" smtClean="0"/>
               <a:pPr/>
-              <a:t>27/09/2013</a:t>
+              <a:t>30/09/2013</a:t>
             </a:fld>
             <a:endParaRPr lang="en-AU"/>
           </a:p>
@@ -2540,7 +2542,7 @@
             <a:fld id="{23031417-08DC-4991-BA64-45FCA174C9D0}" type="datetimeFigureOut">
               <a:rPr lang="en-AU" smtClean="0"/>
               <a:pPr/>
-              <a:t>27/09/2013</a:t>
+              <a:t>30/09/2013</a:t>
             </a:fld>
             <a:endParaRPr lang="en-AU"/>
           </a:p>
@@ -2755,7 +2757,7 @@
             <a:fld id="{23031417-08DC-4991-BA64-45FCA174C9D0}" type="datetimeFigureOut">
               <a:rPr lang="en-AU" smtClean="0"/>
               <a:pPr/>
-              <a:t>27/09/2013</a:t>
+              <a:t>30/09/2013</a:t>
             </a:fld>
             <a:endParaRPr lang="en-AU"/>
           </a:p>
@@ -3439,6 +3441,13 @@
   <p:clrMapOvr>
     <a:masterClrMapping/>
   </p:clrMapOvr>
+  <p:timing>
+    <p:tnLst>
+      <p:par>
+        <p:cTn id="1" dur="indefinite" restart="never" nodeType="tmRoot"/>
+      </p:par>
+    </p:tnLst>
+  </p:timing>
 </p:sld>
 </file>
 
@@ -4000,6 +4009,13 @@
   <p:clrMapOvr>
     <a:masterClrMapping/>
   </p:clrMapOvr>
+  <p:timing>
+    <p:tnLst>
+      <p:par>
+        <p:cTn id="1" dur="indefinite" restart="never" nodeType="tmRoot"/>
+      </p:par>
+    </p:tnLst>
+  </p:timing>
 </p:sld>
 </file>
 
@@ -4548,6 +4564,13 @@
   <p:clrMapOvr>
     <a:masterClrMapping/>
   </p:clrMapOvr>
+  <p:timing>
+    <p:tnLst>
+      <p:par>
+        <p:cTn id="1" dur="indefinite" restart="never" nodeType="tmRoot"/>
+      </p:par>
+    </p:tnLst>
+  </p:timing>
 </p:sld>
 </file>
 
@@ -4970,6 +4993,997 @@
   <p:clrMapOvr>
     <a:masterClrMapping/>
   </p:clrMapOvr>
+  <p:timing>
+    <p:tnLst>
+      <p:par>
+        <p:cTn id="1" dur="indefinite" restart="never" nodeType="tmRoot"/>
+      </p:par>
+    </p:tnLst>
+  </p:timing>
+</p:sld>
+</file>
+
+<file path=ppt/slides/slide14.xml><?xml version="1.0" encoding="utf-8"?>
+<p:sld xmlns:a="http://schemas.openxmlformats.org/drawingml/2006/main" xmlns:r="http://schemas.openxmlformats.org/officeDocument/2006/relationships" xmlns:p="http://schemas.openxmlformats.org/presentationml/2006/main">
+  <p:cSld>
+    <p:spTree>
+      <p:nvGrpSpPr>
+        <p:cNvPr id="1" name=""/>
+        <p:cNvGrpSpPr/>
+        <p:nvPr/>
+      </p:nvGrpSpPr>
+      <p:grpSpPr>
+        <a:xfrm>
+          <a:off x="0" y="0"/>
+          <a:ext cx="0" cy="0"/>
+          <a:chOff x="0" y="0"/>
+          <a:chExt cx="0" cy="0"/>
+        </a:xfrm>
+      </p:grpSpPr>
+      <p:sp>
+        <p:nvSpPr>
+          <p:cNvPr id="4" name="Rectangle 3"/>
+          <p:cNvSpPr/>
+          <p:nvPr/>
+        </p:nvSpPr>
+        <p:spPr>
+          <a:xfrm>
+            <a:off x="0" y="0"/>
+            <a:ext cx="6120000" cy="8280000"/>
+          </a:xfrm>
+          <a:prstGeom prst="rect">
+            <a:avLst/>
+          </a:prstGeom>
+          <a:noFill/>
+          <a:ln w="6350"/>
+        </p:spPr>
+        <p:style>
+          <a:lnRef idx="2">
+            <a:schemeClr val="accent1">
+              <a:shade val="50000"/>
+            </a:schemeClr>
+          </a:lnRef>
+          <a:fillRef idx="1">
+            <a:schemeClr val="accent1"/>
+          </a:fillRef>
+          <a:effectRef idx="0">
+            <a:schemeClr val="accent1"/>
+          </a:effectRef>
+          <a:fontRef idx="minor">
+            <a:schemeClr val="lt1"/>
+          </a:fontRef>
+        </p:style>
+        <p:txBody>
+          <a:bodyPr rtlCol="0" anchor="ctr"/>
+          <a:lstStyle/>
+          <a:p>
+            <a:pPr algn="ctr"/>
+            <a:endParaRPr lang="en-AU"/>
+          </a:p>
+        </p:txBody>
+      </p:sp>
+      <p:sp>
+        <p:nvSpPr>
+          <p:cNvPr id="5" name="Rectangle 4"/>
+          <p:cNvSpPr/>
+          <p:nvPr/>
+        </p:nvSpPr>
+        <p:spPr>
+          <a:xfrm>
+            <a:off x="0" y="0"/>
+            <a:ext cx="3060000" cy="8280000"/>
+          </a:xfrm>
+          <a:prstGeom prst="rect">
+            <a:avLst/>
+          </a:prstGeom>
+          <a:noFill/>
+          <a:ln w="6350"/>
+        </p:spPr>
+        <p:style>
+          <a:lnRef idx="2">
+            <a:schemeClr val="accent1">
+              <a:shade val="50000"/>
+            </a:schemeClr>
+          </a:lnRef>
+          <a:fillRef idx="1">
+            <a:schemeClr val="accent1"/>
+          </a:fillRef>
+          <a:effectRef idx="0">
+            <a:schemeClr val="accent1"/>
+          </a:effectRef>
+          <a:fontRef idx="minor">
+            <a:schemeClr val="lt1"/>
+          </a:fontRef>
+        </p:style>
+        <p:txBody>
+          <a:bodyPr rtlCol="0" anchor="ctr"/>
+          <a:lstStyle/>
+          <a:p>
+            <a:pPr algn="ctr"/>
+            <a:endParaRPr lang="en-AU"/>
+          </a:p>
+        </p:txBody>
+      </p:sp>
+      <p:sp>
+        <p:nvSpPr>
+          <p:cNvPr id="6" name="Rectangle 5"/>
+          <p:cNvSpPr/>
+          <p:nvPr/>
+        </p:nvSpPr>
+        <p:spPr>
+          <a:xfrm>
+            <a:off x="0" y="1"/>
+            <a:ext cx="6120000" cy="4140000"/>
+          </a:xfrm>
+          <a:prstGeom prst="rect">
+            <a:avLst/>
+          </a:prstGeom>
+          <a:noFill/>
+          <a:ln w="3175"/>
+        </p:spPr>
+        <p:style>
+          <a:lnRef idx="2">
+            <a:schemeClr val="accent1">
+              <a:shade val="50000"/>
+            </a:schemeClr>
+          </a:lnRef>
+          <a:fillRef idx="1">
+            <a:schemeClr val="accent1"/>
+          </a:fillRef>
+          <a:effectRef idx="0">
+            <a:schemeClr val="accent1"/>
+          </a:effectRef>
+          <a:fontRef idx="minor">
+            <a:schemeClr val="lt1"/>
+          </a:fontRef>
+        </p:style>
+        <p:txBody>
+          <a:bodyPr rtlCol="0" anchor="ctr"/>
+          <a:lstStyle/>
+          <a:p>
+            <a:pPr algn="ctr"/>
+            <a:endParaRPr lang="en-AU"/>
+          </a:p>
+        </p:txBody>
+      </p:sp>
+      <p:sp>
+        <p:nvSpPr>
+          <p:cNvPr id="7" name="TextBox 6"/>
+          <p:cNvSpPr txBox="1"/>
+          <p:nvPr/>
+        </p:nvSpPr>
+        <p:spPr>
+          <a:xfrm>
+            <a:off x="0" y="2"/>
+            <a:ext cx="295274" cy="276999"/>
+          </a:xfrm>
+          <a:prstGeom prst="rect">
+            <a:avLst/>
+          </a:prstGeom>
+          <a:noFill/>
+        </p:spPr>
+        <p:txBody>
+          <a:bodyPr wrap="none" rtlCol="0">
+            <a:spAutoFit/>
+          </a:bodyPr>
+          <a:lstStyle/>
+          <a:p>
+            <a:r>
+              <a:rPr lang="en-AU" sz="1200" b="1" dirty="0" smtClean="0">
+                <a:latin typeface="Arial" panose="020B0604020202020204" pitchFamily="34" charset="0"/>
+                <a:cs typeface="Arial" panose="020B0604020202020204" pitchFamily="34" charset="0"/>
+              </a:rPr>
+              <a:t>A</a:t>
+            </a:r>
+            <a:endParaRPr lang="en-AU" sz="1200" b="1" dirty="0">
+              <a:latin typeface="Arial" panose="020B0604020202020204" pitchFamily="34" charset="0"/>
+              <a:cs typeface="Arial" panose="020B0604020202020204" pitchFamily="34" charset="0"/>
+            </a:endParaRPr>
+          </a:p>
+        </p:txBody>
+      </p:sp>
+      <p:sp>
+        <p:nvSpPr>
+          <p:cNvPr id="8" name="TextBox 7"/>
+          <p:cNvSpPr txBox="1"/>
+          <p:nvPr/>
+        </p:nvSpPr>
+        <p:spPr>
+          <a:xfrm>
+            <a:off x="3060000" y="-1"/>
+            <a:ext cx="295274" cy="276999"/>
+          </a:xfrm>
+          <a:prstGeom prst="rect">
+            <a:avLst/>
+          </a:prstGeom>
+          <a:noFill/>
+        </p:spPr>
+        <p:txBody>
+          <a:bodyPr wrap="none" rtlCol="0">
+            <a:spAutoFit/>
+          </a:bodyPr>
+          <a:lstStyle/>
+          <a:p>
+            <a:r>
+              <a:rPr lang="en-AU" sz="1200" b="1" dirty="0">
+                <a:latin typeface="Arial" panose="020B0604020202020204" pitchFamily="34" charset="0"/>
+                <a:cs typeface="Arial" panose="020B0604020202020204" pitchFamily="34" charset="0"/>
+              </a:rPr>
+              <a:t>B</a:t>
+            </a:r>
+          </a:p>
+        </p:txBody>
+      </p:sp>
+      <p:sp>
+        <p:nvSpPr>
+          <p:cNvPr id="9" name="TextBox 8"/>
+          <p:cNvSpPr txBox="1"/>
+          <p:nvPr/>
+        </p:nvSpPr>
+        <p:spPr>
+          <a:xfrm>
+            <a:off x="0" y="4140522"/>
+            <a:ext cx="295274" cy="276999"/>
+          </a:xfrm>
+          <a:prstGeom prst="rect">
+            <a:avLst/>
+          </a:prstGeom>
+          <a:noFill/>
+        </p:spPr>
+        <p:txBody>
+          <a:bodyPr wrap="none" rtlCol="0">
+            <a:spAutoFit/>
+          </a:bodyPr>
+          <a:lstStyle/>
+          <a:p>
+            <a:r>
+              <a:rPr lang="en-AU" sz="1200" b="1" dirty="0">
+                <a:latin typeface="Arial" panose="020B0604020202020204" pitchFamily="34" charset="0"/>
+                <a:cs typeface="Arial" panose="020B0604020202020204" pitchFamily="34" charset="0"/>
+              </a:rPr>
+              <a:t>C</a:t>
+            </a:r>
+          </a:p>
+        </p:txBody>
+      </p:sp>
+      <p:sp>
+        <p:nvSpPr>
+          <p:cNvPr id="10" name="TextBox 9"/>
+          <p:cNvSpPr txBox="1"/>
+          <p:nvPr/>
+        </p:nvSpPr>
+        <p:spPr>
+          <a:xfrm>
+            <a:off x="3060000" y="4154548"/>
+            <a:ext cx="295274" cy="276999"/>
+          </a:xfrm>
+          <a:prstGeom prst="rect">
+            <a:avLst/>
+          </a:prstGeom>
+          <a:noFill/>
+        </p:spPr>
+        <p:txBody>
+          <a:bodyPr wrap="none" rtlCol="0">
+            <a:spAutoFit/>
+          </a:bodyPr>
+          <a:lstStyle/>
+          <a:p>
+            <a:r>
+              <a:rPr lang="en-AU" sz="1200" b="1" dirty="0">
+                <a:latin typeface="Arial" panose="020B0604020202020204" pitchFamily="34" charset="0"/>
+                <a:cs typeface="Arial" panose="020B0604020202020204" pitchFamily="34" charset="0"/>
+              </a:rPr>
+              <a:t>D</a:t>
+            </a:r>
+          </a:p>
+        </p:txBody>
+      </p:sp>
+      <p:pic>
+        <p:nvPicPr>
+          <p:cNvPr id="2" name="Picture 3"/>
+          <p:cNvPicPr>
+            <a:picLocks noChangeAspect="1" noChangeArrowheads="1"/>
+          </p:cNvPicPr>
+          <p:nvPr/>
+        </p:nvPicPr>
+        <p:blipFill rotWithShape="1">
+          <a:blip r:embed="rId2" cstate="print">
+            <a:extLst>
+              <a:ext uri="{28A0092B-C50C-407E-A947-70E740481C1C}">
+                <a14:useLocalDpi xmlns:a14="http://schemas.microsoft.com/office/drawing/2010/main" val="0"/>
+              </a:ext>
+            </a:extLst>
+          </a:blip>
+          <a:srcRect l="1205" t="6353" r="8434" b="2078"/>
+          <a:stretch/>
+        </p:blipFill>
+        <p:spPr bwMode="auto">
+          <a:xfrm>
+            <a:off x="180000" y="432000"/>
+            <a:ext cx="2700000" cy="3672000"/>
+          </a:xfrm>
+          <a:prstGeom prst="rect">
+            <a:avLst/>
+          </a:prstGeom>
+          <a:noFill/>
+          <a:ln>
+            <a:noFill/>
+          </a:ln>
+          <a:extLst>
+            <a:ext uri="{909E8E84-426E-40DD-AFC4-6F175D3DCCD1}">
+              <a14:hiddenFill xmlns:a14="http://schemas.microsoft.com/office/drawing/2010/main">
+                <a:solidFill>
+                  <a:schemeClr val="accent1"/>
+                </a:solidFill>
+              </a14:hiddenFill>
+            </a:ext>
+            <a:ext uri="{91240B29-F687-4F45-9708-019B960494DF}">
+              <a14:hiddenLine xmlns:a14="http://schemas.microsoft.com/office/drawing/2010/main" w="9525">
+                <a:solidFill>
+                  <a:schemeClr val="tx1"/>
+                </a:solidFill>
+                <a:miter lim="800000"/>
+                <a:headEnd/>
+                <a:tailEnd/>
+              </a14:hiddenLine>
+            </a:ext>
+          </a:extLst>
+        </p:spPr>
+      </p:pic>
+      <p:pic>
+        <p:nvPicPr>
+          <p:cNvPr id="1028" name="Picture 4"/>
+          <p:cNvPicPr>
+            <a:picLocks noChangeAspect="1" noChangeArrowheads="1"/>
+          </p:cNvPicPr>
+          <p:nvPr/>
+        </p:nvPicPr>
+        <p:blipFill rotWithShape="1">
+          <a:blip r:embed="rId3" cstate="print">
+            <a:extLst>
+              <a:ext uri="{28A0092B-C50C-407E-A947-70E740481C1C}">
+                <a14:useLocalDpi xmlns:a14="http://schemas.microsoft.com/office/drawing/2010/main" val="0"/>
+              </a:ext>
+            </a:extLst>
+          </a:blip>
+          <a:srcRect l="1205" t="6237" r="7229" b="2418"/>
+          <a:stretch/>
+        </p:blipFill>
+        <p:spPr bwMode="auto">
+          <a:xfrm>
+            <a:off x="3240000" y="432000"/>
+            <a:ext cx="2736000" cy="3636000"/>
+          </a:xfrm>
+          <a:prstGeom prst="rect">
+            <a:avLst/>
+          </a:prstGeom>
+          <a:noFill/>
+          <a:ln>
+            <a:noFill/>
+          </a:ln>
+          <a:extLst>
+            <a:ext uri="{909E8E84-426E-40DD-AFC4-6F175D3DCCD1}">
+              <a14:hiddenFill xmlns:a14="http://schemas.microsoft.com/office/drawing/2010/main">
+                <a:solidFill>
+                  <a:schemeClr val="accent1"/>
+                </a:solidFill>
+              </a14:hiddenFill>
+            </a:ext>
+            <a:ext uri="{91240B29-F687-4F45-9708-019B960494DF}">
+              <a14:hiddenLine xmlns:a14="http://schemas.microsoft.com/office/drawing/2010/main" w="9525">
+                <a:solidFill>
+                  <a:schemeClr val="tx1"/>
+                </a:solidFill>
+                <a:miter lim="800000"/>
+                <a:headEnd/>
+                <a:tailEnd/>
+              </a14:hiddenLine>
+            </a:ext>
+          </a:extLst>
+        </p:spPr>
+      </p:pic>
+      <p:pic>
+        <p:nvPicPr>
+          <p:cNvPr id="1029" name="Picture 5"/>
+          <p:cNvPicPr>
+            <a:picLocks noChangeAspect="1" noChangeArrowheads="1"/>
+          </p:cNvPicPr>
+          <p:nvPr/>
+        </p:nvPicPr>
+        <p:blipFill rotWithShape="1">
+          <a:blip r:embed="rId4" cstate="print">
+            <a:extLst>
+              <a:ext uri="{28A0092B-C50C-407E-A947-70E740481C1C}">
+                <a14:useLocalDpi xmlns:a14="http://schemas.microsoft.com/office/drawing/2010/main" val="0"/>
+              </a:ext>
+            </a:extLst>
+          </a:blip>
+          <a:srcRect l="1205" t="6066" r="8434" b="2193"/>
+          <a:stretch/>
+        </p:blipFill>
+        <p:spPr bwMode="auto">
+          <a:xfrm>
+            <a:off x="180000" y="4428000"/>
+            <a:ext cx="2700000" cy="3672000"/>
+          </a:xfrm>
+          <a:prstGeom prst="rect">
+            <a:avLst/>
+          </a:prstGeom>
+          <a:noFill/>
+          <a:ln>
+            <a:noFill/>
+          </a:ln>
+          <a:extLst>
+            <a:ext uri="{909E8E84-426E-40DD-AFC4-6F175D3DCCD1}">
+              <a14:hiddenFill xmlns:a14="http://schemas.microsoft.com/office/drawing/2010/main">
+                <a:solidFill>
+                  <a:schemeClr val="accent1"/>
+                </a:solidFill>
+              </a14:hiddenFill>
+            </a:ext>
+            <a:ext uri="{91240B29-F687-4F45-9708-019B960494DF}">
+              <a14:hiddenLine xmlns:a14="http://schemas.microsoft.com/office/drawing/2010/main" w="9525">
+                <a:solidFill>
+                  <a:schemeClr val="tx1"/>
+                </a:solidFill>
+                <a:miter lim="800000"/>
+                <a:headEnd/>
+                <a:tailEnd/>
+              </a14:hiddenLine>
+            </a:ext>
+          </a:extLst>
+        </p:spPr>
+      </p:pic>
+      <p:pic>
+        <p:nvPicPr>
+          <p:cNvPr id="1031" name="Picture 7"/>
+          <p:cNvPicPr>
+            <a:picLocks noChangeAspect="1" noChangeArrowheads="1"/>
+          </p:cNvPicPr>
+          <p:nvPr/>
+        </p:nvPicPr>
+        <p:blipFill rotWithShape="1">
+          <a:blip r:embed="rId5" cstate="print">
+            <a:extLst>
+              <a:ext uri="{28A0092B-C50C-407E-A947-70E740481C1C}">
+                <a14:useLocalDpi xmlns:a14="http://schemas.microsoft.com/office/drawing/2010/main" val="0"/>
+              </a:ext>
+            </a:extLst>
+          </a:blip>
+          <a:srcRect l="1205" t="6720" r="8434" b="1741"/>
+          <a:stretch/>
+        </p:blipFill>
+        <p:spPr bwMode="auto">
+          <a:xfrm>
+            <a:off x="3240000" y="4428000"/>
+            <a:ext cx="2700000" cy="3672000"/>
+          </a:xfrm>
+          <a:prstGeom prst="rect">
+            <a:avLst/>
+          </a:prstGeom>
+          <a:noFill/>
+          <a:ln>
+            <a:noFill/>
+          </a:ln>
+          <a:extLst>
+            <a:ext uri="{909E8E84-426E-40DD-AFC4-6F175D3DCCD1}">
+              <a14:hiddenFill xmlns:a14="http://schemas.microsoft.com/office/drawing/2010/main">
+                <a:solidFill>
+                  <a:schemeClr val="accent1"/>
+                </a:solidFill>
+              </a14:hiddenFill>
+            </a:ext>
+            <a:ext uri="{91240B29-F687-4F45-9708-019B960494DF}">
+              <a14:hiddenLine xmlns:a14="http://schemas.microsoft.com/office/drawing/2010/main" w="9525">
+                <a:solidFill>
+                  <a:schemeClr val="tx1"/>
+                </a:solidFill>
+                <a:miter lim="800000"/>
+                <a:headEnd/>
+                <a:tailEnd/>
+              </a14:hiddenLine>
+            </a:ext>
+          </a:extLst>
+        </p:spPr>
+      </p:pic>
+      <p:pic>
+        <p:nvPicPr>
+          <p:cNvPr id="1032" name="Picture 8"/>
+          <p:cNvPicPr>
+            <a:picLocks noChangeAspect="1" noChangeArrowheads="1"/>
+          </p:cNvPicPr>
+          <p:nvPr/>
+        </p:nvPicPr>
+        <p:blipFill rotWithShape="1">
+          <a:blip r:embed="rId6" cstate="print">
+            <a:extLst>
+              <a:ext uri="{28A0092B-C50C-407E-A947-70E740481C1C}">
+                <a14:useLocalDpi xmlns:a14="http://schemas.microsoft.com/office/drawing/2010/main" val="0"/>
+              </a:ext>
+            </a:extLst>
+          </a:blip>
+          <a:srcRect l="591" t="2597" r="614" b="93814"/>
+          <a:stretch/>
+        </p:blipFill>
+        <p:spPr bwMode="auto">
+          <a:xfrm>
+            <a:off x="1584000" y="237600"/>
+            <a:ext cx="2952000" cy="144000"/>
+          </a:xfrm>
+          <a:prstGeom prst="rect">
+            <a:avLst/>
+          </a:prstGeom>
+          <a:noFill/>
+          <a:ln>
+            <a:noFill/>
+          </a:ln>
+          <a:extLst>
+            <a:ext uri="{909E8E84-426E-40DD-AFC4-6F175D3DCCD1}">
+              <a14:hiddenFill xmlns:a14="http://schemas.microsoft.com/office/drawing/2010/main">
+                <a:solidFill>
+                  <a:schemeClr val="accent1"/>
+                </a:solidFill>
+              </a14:hiddenFill>
+            </a:ext>
+            <a:ext uri="{91240B29-F687-4F45-9708-019B960494DF}">
+              <a14:hiddenLine xmlns:a14="http://schemas.microsoft.com/office/drawing/2010/main" w="9525">
+                <a:solidFill>
+                  <a:schemeClr val="tx1"/>
+                </a:solidFill>
+                <a:miter lim="800000"/>
+                <a:headEnd/>
+                <a:tailEnd/>
+              </a14:hiddenLine>
+            </a:ext>
+          </a:extLst>
+        </p:spPr>
+      </p:pic>
+    </p:spTree>
+    <p:extLst>
+      <p:ext uri="{BB962C8B-B14F-4D97-AF65-F5344CB8AC3E}">
+        <p14:creationId xmlns:p14="http://schemas.microsoft.com/office/powerpoint/2010/main" val="3122463977"/>
+      </p:ext>
+    </p:extLst>
+  </p:cSld>
+  <p:clrMapOvr>
+    <a:masterClrMapping/>
+  </p:clrMapOvr>
+  <p:timing>
+    <p:tnLst>
+      <p:par>
+        <p:cTn id="1" dur="indefinite" restart="never" nodeType="tmRoot"/>
+      </p:par>
+    </p:tnLst>
+  </p:timing>
+</p:sld>
+</file>
+
+<file path=ppt/slides/slide15.xml><?xml version="1.0" encoding="utf-8"?>
+<p:sld xmlns:a="http://schemas.openxmlformats.org/drawingml/2006/main" xmlns:r="http://schemas.openxmlformats.org/officeDocument/2006/relationships" xmlns:p="http://schemas.openxmlformats.org/presentationml/2006/main">
+  <p:cSld>
+    <p:spTree>
+      <p:nvGrpSpPr>
+        <p:cNvPr id="1" name=""/>
+        <p:cNvGrpSpPr/>
+        <p:nvPr/>
+      </p:nvGrpSpPr>
+      <p:grpSpPr>
+        <a:xfrm>
+          <a:off x="0" y="0"/>
+          <a:ext cx="0" cy="0"/>
+          <a:chOff x="0" y="0"/>
+          <a:chExt cx="0" cy="0"/>
+        </a:xfrm>
+      </p:grpSpPr>
+      <p:sp>
+        <p:nvSpPr>
+          <p:cNvPr id="7" name="TextBox 6"/>
+          <p:cNvSpPr txBox="1"/>
+          <p:nvPr/>
+        </p:nvSpPr>
+        <p:spPr>
+          <a:xfrm>
+            <a:off x="0" y="190800"/>
+            <a:ext cx="295274" cy="276999"/>
+          </a:xfrm>
+          <a:prstGeom prst="rect">
+            <a:avLst/>
+          </a:prstGeom>
+          <a:noFill/>
+        </p:spPr>
+        <p:txBody>
+          <a:bodyPr wrap="none" rtlCol="0">
+            <a:spAutoFit/>
+          </a:bodyPr>
+          <a:lstStyle/>
+          <a:p>
+            <a:r>
+              <a:rPr lang="en-AU" sz="1200" b="1" dirty="0" smtClean="0">
+                <a:latin typeface="Arial" panose="020B0604020202020204" pitchFamily="34" charset="0"/>
+                <a:cs typeface="Arial" panose="020B0604020202020204" pitchFamily="34" charset="0"/>
+              </a:rPr>
+              <a:t>A</a:t>
+            </a:r>
+            <a:endParaRPr lang="en-AU" sz="1200" b="1" dirty="0">
+              <a:latin typeface="Arial" panose="020B0604020202020204" pitchFamily="34" charset="0"/>
+              <a:cs typeface="Arial" panose="020B0604020202020204" pitchFamily="34" charset="0"/>
+            </a:endParaRPr>
+          </a:p>
+        </p:txBody>
+      </p:sp>
+      <p:sp>
+        <p:nvSpPr>
+          <p:cNvPr id="8" name="TextBox 7"/>
+          <p:cNvSpPr txBox="1"/>
+          <p:nvPr/>
+        </p:nvSpPr>
+        <p:spPr>
+          <a:xfrm>
+            <a:off x="3060000" y="190800"/>
+            <a:ext cx="295274" cy="276999"/>
+          </a:xfrm>
+          <a:prstGeom prst="rect">
+            <a:avLst/>
+          </a:prstGeom>
+          <a:noFill/>
+        </p:spPr>
+        <p:txBody>
+          <a:bodyPr wrap="none" rtlCol="0">
+            <a:spAutoFit/>
+          </a:bodyPr>
+          <a:lstStyle/>
+          <a:p>
+            <a:r>
+              <a:rPr lang="en-AU" sz="1200" b="1" dirty="0">
+                <a:latin typeface="Arial" panose="020B0604020202020204" pitchFamily="34" charset="0"/>
+                <a:cs typeface="Arial" panose="020B0604020202020204" pitchFamily="34" charset="0"/>
+              </a:rPr>
+              <a:t>B</a:t>
+            </a:r>
+          </a:p>
+        </p:txBody>
+      </p:sp>
+      <p:sp>
+        <p:nvSpPr>
+          <p:cNvPr id="9" name="TextBox 8"/>
+          <p:cNvSpPr txBox="1"/>
+          <p:nvPr/>
+        </p:nvSpPr>
+        <p:spPr>
+          <a:xfrm>
+            <a:off x="0" y="4140522"/>
+            <a:ext cx="295274" cy="276999"/>
+          </a:xfrm>
+          <a:prstGeom prst="rect">
+            <a:avLst/>
+          </a:prstGeom>
+          <a:noFill/>
+        </p:spPr>
+        <p:txBody>
+          <a:bodyPr wrap="none" rtlCol="0">
+            <a:spAutoFit/>
+          </a:bodyPr>
+          <a:lstStyle/>
+          <a:p>
+            <a:r>
+              <a:rPr lang="en-AU" sz="1200" b="1" dirty="0">
+                <a:latin typeface="Arial" panose="020B0604020202020204" pitchFamily="34" charset="0"/>
+                <a:cs typeface="Arial" panose="020B0604020202020204" pitchFamily="34" charset="0"/>
+              </a:rPr>
+              <a:t>C</a:t>
+            </a:r>
+          </a:p>
+        </p:txBody>
+      </p:sp>
+      <p:sp>
+        <p:nvSpPr>
+          <p:cNvPr id="10" name="TextBox 9"/>
+          <p:cNvSpPr txBox="1"/>
+          <p:nvPr/>
+        </p:nvSpPr>
+        <p:spPr>
+          <a:xfrm>
+            <a:off x="3060000" y="4154548"/>
+            <a:ext cx="295274" cy="276999"/>
+          </a:xfrm>
+          <a:prstGeom prst="rect">
+            <a:avLst/>
+          </a:prstGeom>
+          <a:noFill/>
+        </p:spPr>
+        <p:txBody>
+          <a:bodyPr wrap="none" rtlCol="0">
+            <a:spAutoFit/>
+          </a:bodyPr>
+          <a:lstStyle/>
+          <a:p>
+            <a:r>
+              <a:rPr lang="en-AU" sz="1200" b="1" dirty="0">
+                <a:latin typeface="Arial" panose="020B0604020202020204" pitchFamily="34" charset="0"/>
+                <a:cs typeface="Arial" panose="020B0604020202020204" pitchFamily="34" charset="0"/>
+              </a:rPr>
+              <a:t>D</a:t>
+            </a:r>
+          </a:p>
+        </p:txBody>
+      </p:sp>
+      <p:pic>
+        <p:nvPicPr>
+          <p:cNvPr id="2" name="Picture 3"/>
+          <p:cNvPicPr>
+            <a:picLocks noChangeAspect="1" noChangeArrowheads="1"/>
+          </p:cNvPicPr>
+          <p:nvPr/>
+        </p:nvPicPr>
+        <p:blipFill rotWithShape="1">
+          <a:blip r:embed="rId2" cstate="print">
+            <a:extLst>
+              <a:ext uri="{28A0092B-C50C-407E-A947-70E740481C1C}">
+                <a14:useLocalDpi xmlns:a14="http://schemas.microsoft.com/office/drawing/2010/main" val="0"/>
+              </a:ext>
+            </a:extLst>
+          </a:blip>
+          <a:srcRect l="1205" t="6353" r="8434" b="2078"/>
+          <a:stretch/>
+        </p:blipFill>
+        <p:spPr bwMode="auto">
+          <a:xfrm>
+            <a:off x="180000" y="432000"/>
+            <a:ext cx="2700000" cy="3672000"/>
+          </a:xfrm>
+          <a:prstGeom prst="rect">
+            <a:avLst/>
+          </a:prstGeom>
+          <a:noFill/>
+          <a:ln>
+            <a:noFill/>
+          </a:ln>
+          <a:extLst>
+            <a:ext uri="{909E8E84-426E-40DD-AFC4-6F175D3DCCD1}">
+              <a14:hiddenFill xmlns:a14="http://schemas.microsoft.com/office/drawing/2010/main">
+                <a:solidFill>
+                  <a:schemeClr val="accent1"/>
+                </a:solidFill>
+              </a14:hiddenFill>
+            </a:ext>
+            <a:ext uri="{91240B29-F687-4F45-9708-019B960494DF}">
+              <a14:hiddenLine xmlns:a14="http://schemas.microsoft.com/office/drawing/2010/main" w="9525">
+                <a:solidFill>
+                  <a:schemeClr val="tx1"/>
+                </a:solidFill>
+                <a:miter lim="800000"/>
+                <a:headEnd/>
+                <a:tailEnd/>
+              </a14:hiddenLine>
+            </a:ext>
+          </a:extLst>
+        </p:spPr>
+      </p:pic>
+      <p:pic>
+        <p:nvPicPr>
+          <p:cNvPr id="1028" name="Picture 4"/>
+          <p:cNvPicPr>
+            <a:picLocks noChangeAspect="1" noChangeArrowheads="1"/>
+          </p:cNvPicPr>
+          <p:nvPr/>
+        </p:nvPicPr>
+        <p:blipFill rotWithShape="1">
+          <a:blip r:embed="rId3" cstate="print">
+            <a:extLst>
+              <a:ext uri="{28A0092B-C50C-407E-A947-70E740481C1C}">
+                <a14:useLocalDpi xmlns:a14="http://schemas.microsoft.com/office/drawing/2010/main" val="0"/>
+              </a:ext>
+            </a:extLst>
+          </a:blip>
+          <a:srcRect l="1205" t="6237" r="7229" b="2418"/>
+          <a:stretch/>
+        </p:blipFill>
+        <p:spPr bwMode="auto">
+          <a:xfrm>
+            <a:off x="3240000" y="432000"/>
+            <a:ext cx="2736000" cy="3636000"/>
+          </a:xfrm>
+          <a:prstGeom prst="rect">
+            <a:avLst/>
+          </a:prstGeom>
+          <a:noFill/>
+          <a:ln>
+            <a:noFill/>
+          </a:ln>
+          <a:extLst>
+            <a:ext uri="{909E8E84-426E-40DD-AFC4-6F175D3DCCD1}">
+              <a14:hiddenFill xmlns:a14="http://schemas.microsoft.com/office/drawing/2010/main">
+                <a:solidFill>
+                  <a:schemeClr val="accent1"/>
+                </a:solidFill>
+              </a14:hiddenFill>
+            </a:ext>
+            <a:ext uri="{91240B29-F687-4F45-9708-019B960494DF}">
+              <a14:hiddenLine xmlns:a14="http://schemas.microsoft.com/office/drawing/2010/main" w="9525">
+                <a:solidFill>
+                  <a:schemeClr val="tx1"/>
+                </a:solidFill>
+                <a:miter lim="800000"/>
+                <a:headEnd/>
+                <a:tailEnd/>
+              </a14:hiddenLine>
+            </a:ext>
+          </a:extLst>
+        </p:spPr>
+      </p:pic>
+      <p:pic>
+        <p:nvPicPr>
+          <p:cNvPr id="1029" name="Picture 5"/>
+          <p:cNvPicPr>
+            <a:picLocks noChangeAspect="1" noChangeArrowheads="1"/>
+          </p:cNvPicPr>
+          <p:nvPr/>
+        </p:nvPicPr>
+        <p:blipFill rotWithShape="1">
+          <a:blip r:embed="rId4" cstate="print">
+            <a:extLst>
+              <a:ext uri="{28A0092B-C50C-407E-A947-70E740481C1C}">
+                <a14:useLocalDpi xmlns:a14="http://schemas.microsoft.com/office/drawing/2010/main" val="0"/>
+              </a:ext>
+            </a:extLst>
+          </a:blip>
+          <a:srcRect l="1205" t="6066" r="8434" b="2193"/>
+          <a:stretch/>
+        </p:blipFill>
+        <p:spPr bwMode="auto">
+          <a:xfrm>
+            <a:off x="180000" y="4428000"/>
+            <a:ext cx="2700000" cy="3672000"/>
+          </a:xfrm>
+          <a:prstGeom prst="rect">
+            <a:avLst/>
+          </a:prstGeom>
+          <a:noFill/>
+          <a:ln>
+            <a:noFill/>
+          </a:ln>
+          <a:extLst>
+            <a:ext uri="{909E8E84-426E-40DD-AFC4-6F175D3DCCD1}">
+              <a14:hiddenFill xmlns:a14="http://schemas.microsoft.com/office/drawing/2010/main">
+                <a:solidFill>
+                  <a:schemeClr val="accent1"/>
+                </a:solidFill>
+              </a14:hiddenFill>
+            </a:ext>
+            <a:ext uri="{91240B29-F687-4F45-9708-019B960494DF}">
+              <a14:hiddenLine xmlns:a14="http://schemas.microsoft.com/office/drawing/2010/main" w="9525">
+                <a:solidFill>
+                  <a:schemeClr val="tx1"/>
+                </a:solidFill>
+                <a:miter lim="800000"/>
+                <a:headEnd/>
+                <a:tailEnd/>
+              </a14:hiddenLine>
+            </a:ext>
+          </a:extLst>
+        </p:spPr>
+      </p:pic>
+      <p:pic>
+        <p:nvPicPr>
+          <p:cNvPr id="1031" name="Picture 7"/>
+          <p:cNvPicPr>
+            <a:picLocks noChangeAspect="1" noChangeArrowheads="1"/>
+          </p:cNvPicPr>
+          <p:nvPr/>
+        </p:nvPicPr>
+        <p:blipFill rotWithShape="1">
+          <a:blip r:embed="rId5" cstate="print">
+            <a:extLst>
+              <a:ext uri="{28A0092B-C50C-407E-A947-70E740481C1C}">
+                <a14:useLocalDpi xmlns:a14="http://schemas.microsoft.com/office/drawing/2010/main" val="0"/>
+              </a:ext>
+            </a:extLst>
+          </a:blip>
+          <a:srcRect l="1205" t="6720" r="7229" b="1741"/>
+          <a:stretch/>
+        </p:blipFill>
+        <p:spPr bwMode="auto">
+          <a:xfrm>
+            <a:off x="3240000" y="4428000"/>
+            <a:ext cx="2736000" cy="3672000"/>
+          </a:xfrm>
+          <a:prstGeom prst="rect">
+            <a:avLst/>
+          </a:prstGeom>
+          <a:noFill/>
+          <a:ln>
+            <a:noFill/>
+          </a:ln>
+          <a:extLst>
+            <a:ext uri="{909E8E84-426E-40DD-AFC4-6F175D3DCCD1}">
+              <a14:hiddenFill xmlns:a14="http://schemas.microsoft.com/office/drawing/2010/main">
+                <a:solidFill>
+                  <a:schemeClr val="accent1"/>
+                </a:solidFill>
+              </a14:hiddenFill>
+            </a:ext>
+            <a:ext uri="{91240B29-F687-4F45-9708-019B960494DF}">
+              <a14:hiddenLine xmlns:a14="http://schemas.microsoft.com/office/drawing/2010/main" w="9525">
+                <a:solidFill>
+                  <a:schemeClr val="tx1"/>
+                </a:solidFill>
+                <a:miter lim="800000"/>
+                <a:headEnd/>
+                <a:tailEnd/>
+              </a14:hiddenLine>
+            </a:ext>
+          </a:extLst>
+        </p:spPr>
+      </p:pic>
+      <p:pic>
+        <p:nvPicPr>
+          <p:cNvPr id="1032" name="Picture 8"/>
+          <p:cNvPicPr>
+            <a:picLocks noChangeAspect="1" noChangeArrowheads="1"/>
+          </p:cNvPicPr>
+          <p:nvPr/>
+        </p:nvPicPr>
+        <p:blipFill rotWithShape="1">
+          <a:blip r:embed="rId6" cstate="print">
+            <a:extLst>
+              <a:ext uri="{28A0092B-C50C-407E-A947-70E740481C1C}">
+                <a14:useLocalDpi xmlns:a14="http://schemas.microsoft.com/office/drawing/2010/main" val="0"/>
+              </a:ext>
+            </a:extLst>
+          </a:blip>
+          <a:srcRect l="591" t="2597" r="614" b="93814"/>
+          <a:stretch/>
+        </p:blipFill>
+        <p:spPr bwMode="auto">
+          <a:xfrm>
+            <a:off x="1584000" y="0"/>
+            <a:ext cx="2952000" cy="144000"/>
+          </a:xfrm>
+          <a:prstGeom prst="rect">
+            <a:avLst/>
+          </a:prstGeom>
+          <a:noFill/>
+          <a:ln>
+            <a:noFill/>
+          </a:ln>
+          <a:extLst>
+            <a:ext uri="{909E8E84-426E-40DD-AFC4-6F175D3DCCD1}">
+              <a14:hiddenFill xmlns:a14="http://schemas.microsoft.com/office/drawing/2010/main">
+                <a:solidFill>
+                  <a:schemeClr val="accent1"/>
+                </a:solidFill>
+              </a14:hiddenFill>
+            </a:ext>
+            <a:ext uri="{91240B29-F687-4F45-9708-019B960494DF}">
+              <a14:hiddenLine xmlns:a14="http://schemas.microsoft.com/office/drawing/2010/main" w="9525">
+                <a:solidFill>
+                  <a:schemeClr val="tx1"/>
+                </a:solidFill>
+                <a:miter lim="800000"/>
+                <a:headEnd/>
+                <a:tailEnd/>
+              </a14:hiddenLine>
+            </a:ext>
+          </a:extLst>
+        </p:spPr>
+      </p:pic>
+    </p:spTree>
+    <p:extLst>
+      <p:ext uri="{BB962C8B-B14F-4D97-AF65-F5344CB8AC3E}">
+        <p14:creationId xmlns:p14="http://schemas.microsoft.com/office/powerpoint/2010/main" val="2199044932"/>
+      </p:ext>
+    </p:extLst>
+  </p:cSld>
+  <p:clrMapOvr>
+    <a:masterClrMapping/>
+  </p:clrMapOvr>
+  <p:timing>
+    <p:tnLst>
+      <p:par>
+        <p:cTn id="1" dur="indefinite" restart="never" nodeType="tmRoot"/>
+      </p:par>
+    </p:tnLst>
+  </p:timing>
 </p:sld>
 </file>
 

</xml_diff>